<commit_message>
Updated WBS image with progression
</commit_message>
<xml_diff>
--- a/doc/project_plan_final/misc/wbs.pptx
+++ b/doc/project_plan_final/misc/wbs.pptx
@@ -53,7 +53,7 @@
       </p:grpSpPr>
       <p:sp>
         <p:nvSpPr>
-          <p:cNvPr id="26" name="PlaceHolder 1"/>
+          <p:cNvPr id="23" name="PlaceHolder 1"/>
           <p:cNvSpPr>
             <a:spLocks noGrp="1"/>
           </p:cNvSpPr>
@@ -64,7 +64,7 @@
         <p:spPr>
           <a:xfrm>
             <a:off x="1523880" y="1122480"/>
-            <a:ext cx="9143640" cy="2387160"/>
+            <a:ext cx="9143280" cy="2386800"/>
           </a:xfrm>
           <a:prstGeom prst="rect">
             <a:avLst/>
@@ -73,18 +73,16 @@
         <p:txBody>
           <a:bodyPr lIns="0" rIns="0" tIns="0" bIns="0" anchor="ctr"/>
           <a:p>
-            <a:endParaRPr b="0" lang="sv-SE" sz="1800" spc="-1" strike="noStrike">
-              <a:solidFill>
-                <a:srgbClr val="000000"/>
-              </a:solidFill>
-              <a:latin typeface="Calibri"/>
-            </a:endParaRPr>
-          </a:p>
-        </p:txBody>
-      </p:sp>
-      <p:sp>
-        <p:nvSpPr>
-          <p:cNvPr id="27" name="PlaceHolder 2"/>
+            <a:pPr algn="ctr"/>
+            <a:endParaRPr b="0" lang="en-US" sz="4400" spc="-1" strike="noStrike">
+              <a:latin typeface="Arial"/>
+            </a:endParaRPr>
+          </a:p>
+        </p:txBody>
+      </p:sp>
+      <p:sp>
+        <p:nvSpPr>
+          <p:cNvPr id="24" name="PlaceHolder 2"/>
           <p:cNvSpPr>
             <a:spLocks noGrp="1"/>
           </p:cNvSpPr>
@@ -106,18 +104,15 @@
             <a:normAutofit/>
           </a:bodyPr>
           <a:p>
-            <a:endParaRPr b="0" lang="sv-SE" sz="2800" spc="-1" strike="noStrike">
-              <a:solidFill>
-                <a:srgbClr val="000000"/>
-              </a:solidFill>
-              <a:latin typeface="Calibri"/>
-            </a:endParaRPr>
-          </a:p>
-        </p:txBody>
-      </p:sp>
-      <p:sp>
-        <p:nvSpPr>
-          <p:cNvPr id="28" name="PlaceHolder 3"/>
+            <a:endParaRPr b="0" lang="en-US" sz="3200" spc="-1" strike="noStrike">
+              <a:latin typeface="Arial"/>
+            </a:endParaRPr>
+          </a:p>
+        </p:txBody>
+      </p:sp>
+      <p:sp>
+        <p:nvSpPr>
+          <p:cNvPr id="25" name="PlaceHolder 3"/>
           <p:cNvSpPr>
             <a:spLocks noGrp="1"/>
           </p:cNvSpPr>
@@ -139,11 +134,8 @@
             <a:normAutofit/>
           </a:bodyPr>
           <a:p>
-            <a:endParaRPr b="0" lang="sv-SE" sz="2800" spc="-1" strike="noStrike">
-              <a:solidFill>
-                <a:srgbClr val="000000"/>
-              </a:solidFill>
-              <a:latin typeface="Calibri"/>
+            <a:endParaRPr b="0" lang="en-US" sz="3200" spc="-1" strike="noStrike">
+              <a:latin typeface="Arial"/>
             </a:endParaRPr>
           </a:p>
         </p:txBody>
@@ -172,7 +164,7 @@
       </p:grpSpPr>
       <p:sp>
         <p:nvSpPr>
-          <p:cNvPr id="29" name="PlaceHolder 1"/>
+          <p:cNvPr id="26" name="PlaceHolder 1"/>
           <p:cNvSpPr>
             <a:spLocks noGrp="1"/>
           </p:cNvSpPr>
@@ -183,7 +175,7 @@
         <p:spPr>
           <a:xfrm>
             <a:off x="1523880" y="1122480"/>
-            <a:ext cx="9143640" cy="2387160"/>
+            <a:ext cx="9143280" cy="2386800"/>
           </a:xfrm>
           <a:prstGeom prst="rect">
             <a:avLst/>
@@ -192,18 +184,16 @@
         <p:txBody>
           <a:bodyPr lIns="0" rIns="0" tIns="0" bIns="0" anchor="ctr"/>
           <a:p>
-            <a:endParaRPr b="0" lang="sv-SE" sz="1800" spc="-1" strike="noStrike">
-              <a:solidFill>
-                <a:srgbClr val="000000"/>
-              </a:solidFill>
-              <a:latin typeface="Calibri"/>
-            </a:endParaRPr>
-          </a:p>
-        </p:txBody>
-      </p:sp>
-      <p:sp>
-        <p:nvSpPr>
-          <p:cNvPr id="30" name="PlaceHolder 2"/>
+            <a:pPr algn="ctr"/>
+            <a:endParaRPr b="0" lang="en-US" sz="4400" spc="-1" strike="noStrike">
+              <a:latin typeface="Arial"/>
+            </a:endParaRPr>
+          </a:p>
+        </p:txBody>
+      </p:sp>
+      <p:sp>
+        <p:nvSpPr>
+          <p:cNvPr id="27" name="PlaceHolder 2"/>
           <p:cNvSpPr>
             <a:spLocks noGrp="1"/>
           </p:cNvSpPr>
@@ -225,18 +215,15 @@
             <a:normAutofit/>
           </a:bodyPr>
           <a:p>
-            <a:endParaRPr b="0" lang="sv-SE" sz="2800" spc="-1" strike="noStrike">
-              <a:solidFill>
-                <a:srgbClr val="000000"/>
-              </a:solidFill>
-              <a:latin typeface="Calibri"/>
-            </a:endParaRPr>
-          </a:p>
-        </p:txBody>
-      </p:sp>
-      <p:sp>
-        <p:nvSpPr>
-          <p:cNvPr id="31" name="PlaceHolder 3"/>
+            <a:endParaRPr b="0" lang="en-US" sz="3200" spc="-1" strike="noStrike">
+              <a:latin typeface="Arial"/>
+            </a:endParaRPr>
+          </a:p>
+        </p:txBody>
+      </p:sp>
+      <p:sp>
+        <p:nvSpPr>
+          <p:cNvPr id="28" name="PlaceHolder 3"/>
           <p:cNvSpPr>
             <a:spLocks noGrp="1"/>
           </p:cNvSpPr>
@@ -258,18 +245,15 @@
             <a:normAutofit/>
           </a:bodyPr>
           <a:p>
-            <a:endParaRPr b="0" lang="sv-SE" sz="2800" spc="-1" strike="noStrike">
-              <a:solidFill>
-                <a:srgbClr val="000000"/>
-              </a:solidFill>
-              <a:latin typeface="Calibri"/>
-            </a:endParaRPr>
-          </a:p>
-        </p:txBody>
-      </p:sp>
-      <p:sp>
-        <p:nvSpPr>
-          <p:cNvPr id="32" name="PlaceHolder 4"/>
+            <a:endParaRPr b="0" lang="en-US" sz="3200" spc="-1" strike="noStrike">
+              <a:latin typeface="Arial"/>
+            </a:endParaRPr>
+          </a:p>
+        </p:txBody>
+      </p:sp>
+      <p:sp>
+        <p:nvSpPr>
+          <p:cNvPr id="29" name="PlaceHolder 4"/>
           <p:cNvSpPr>
             <a:spLocks noGrp="1"/>
           </p:cNvSpPr>
@@ -291,18 +275,15 @@
             <a:normAutofit/>
           </a:bodyPr>
           <a:p>
-            <a:endParaRPr b="0" lang="sv-SE" sz="2800" spc="-1" strike="noStrike">
-              <a:solidFill>
-                <a:srgbClr val="000000"/>
-              </a:solidFill>
-              <a:latin typeface="Calibri"/>
-            </a:endParaRPr>
-          </a:p>
-        </p:txBody>
-      </p:sp>
-      <p:sp>
-        <p:nvSpPr>
-          <p:cNvPr id="33" name="PlaceHolder 5"/>
+            <a:endParaRPr b="0" lang="en-US" sz="3200" spc="-1" strike="noStrike">
+              <a:latin typeface="Arial"/>
+            </a:endParaRPr>
+          </a:p>
+        </p:txBody>
+      </p:sp>
+      <p:sp>
+        <p:nvSpPr>
+          <p:cNvPr id="30" name="PlaceHolder 5"/>
           <p:cNvSpPr>
             <a:spLocks noGrp="1"/>
           </p:cNvSpPr>
@@ -324,11 +305,8 @@
             <a:normAutofit/>
           </a:bodyPr>
           <a:p>
-            <a:endParaRPr b="0" lang="sv-SE" sz="2800" spc="-1" strike="noStrike">
-              <a:solidFill>
-                <a:srgbClr val="000000"/>
-              </a:solidFill>
-              <a:latin typeface="Calibri"/>
+            <a:endParaRPr b="0" lang="en-US" sz="3200" spc="-1" strike="noStrike">
+              <a:latin typeface="Arial"/>
             </a:endParaRPr>
           </a:p>
         </p:txBody>
@@ -357,7 +335,7 @@
       </p:grpSpPr>
       <p:sp>
         <p:nvSpPr>
-          <p:cNvPr id="34" name="PlaceHolder 1"/>
+          <p:cNvPr id="31" name="PlaceHolder 1"/>
           <p:cNvSpPr>
             <a:spLocks noGrp="1"/>
           </p:cNvSpPr>
@@ -368,7 +346,7 @@
         <p:spPr>
           <a:xfrm>
             <a:off x="1523880" y="1122480"/>
-            <a:ext cx="9143640" cy="2387160"/>
+            <a:ext cx="9143280" cy="2386800"/>
           </a:xfrm>
           <a:prstGeom prst="rect">
             <a:avLst/>
@@ -377,18 +355,16 @@
         <p:txBody>
           <a:bodyPr lIns="0" rIns="0" tIns="0" bIns="0" anchor="ctr"/>
           <a:p>
-            <a:endParaRPr b="0" lang="sv-SE" sz="1800" spc="-1" strike="noStrike">
-              <a:solidFill>
-                <a:srgbClr val="000000"/>
-              </a:solidFill>
-              <a:latin typeface="Calibri"/>
-            </a:endParaRPr>
-          </a:p>
-        </p:txBody>
-      </p:sp>
-      <p:sp>
-        <p:nvSpPr>
-          <p:cNvPr id="35" name="PlaceHolder 2"/>
+            <a:pPr algn="ctr"/>
+            <a:endParaRPr b="0" lang="en-US" sz="4400" spc="-1" strike="noStrike">
+              <a:latin typeface="Arial"/>
+            </a:endParaRPr>
+          </a:p>
+        </p:txBody>
+      </p:sp>
+      <p:sp>
+        <p:nvSpPr>
+          <p:cNvPr id="32" name="PlaceHolder 2"/>
           <p:cNvSpPr>
             <a:spLocks noGrp="1"/>
           </p:cNvSpPr>
@@ -410,18 +386,15 @@
             <a:normAutofit/>
           </a:bodyPr>
           <a:p>
-            <a:endParaRPr b="0" lang="sv-SE" sz="2800" spc="-1" strike="noStrike">
-              <a:solidFill>
-                <a:srgbClr val="000000"/>
-              </a:solidFill>
-              <a:latin typeface="Calibri"/>
-            </a:endParaRPr>
-          </a:p>
-        </p:txBody>
-      </p:sp>
-      <p:sp>
-        <p:nvSpPr>
-          <p:cNvPr id="36" name="PlaceHolder 3"/>
+            <a:endParaRPr b="0" lang="en-US" sz="3200" spc="-1" strike="noStrike">
+              <a:latin typeface="Arial"/>
+            </a:endParaRPr>
+          </a:p>
+        </p:txBody>
+      </p:sp>
+      <p:sp>
+        <p:nvSpPr>
+          <p:cNvPr id="33" name="PlaceHolder 3"/>
           <p:cNvSpPr>
             <a:spLocks noGrp="1"/>
           </p:cNvSpPr>
@@ -443,18 +416,15 @@
             <a:normAutofit/>
           </a:bodyPr>
           <a:p>
-            <a:endParaRPr b="0" lang="sv-SE" sz="2800" spc="-1" strike="noStrike">
-              <a:solidFill>
-                <a:srgbClr val="000000"/>
-              </a:solidFill>
-              <a:latin typeface="Calibri"/>
-            </a:endParaRPr>
-          </a:p>
-        </p:txBody>
-      </p:sp>
-      <p:sp>
-        <p:nvSpPr>
-          <p:cNvPr id="37" name="PlaceHolder 4"/>
+            <a:endParaRPr b="0" lang="en-US" sz="3200" spc="-1" strike="noStrike">
+              <a:latin typeface="Arial"/>
+            </a:endParaRPr>
+          </a:p>
+        </p:txBody>
+      </p:sp>
+      <p:sp>
+        <p:nvSpPr>
+          <p:cNvPr id="34" name="PlaceHolder 4"/>
           <p:cNvSpPr>
             <a:spLocks noGrp="1"/>
           </p:cNvSpPr>
@@ -476,18 +446,15 @@
             <a:normAutofit/>
           </a:bodyPr>
           <a:p>
-            <a:endParaRPr b="0" lang="sv-SE" sz="2800" spc="-1" strike="noStrike">
-              <a:solidFill>
-                <a:srgbClr val="000000"/>
-              </a:solidFill>
-              <a:latin typeface="Calibri"/>
-            </a:endParaRPr>
-          </a:p>
-        </p:txBody>
-      </p:sp>
-      <p:sp>
-        <p:nvSpPr>
-          <p:cNvPr id="38" name="PlaceHolder 5"/>
+            <a:endParaRPr b="0" lang="en-US" sz="3200" spc="-1" strike="noStrike">
+              <a:latin typeface="Arial"/>
+            </a:endParaRPr>
+          </a:p>
+        </p:txBody>
+      </p:sp>
+      <p:sp>
+        <p:nvSpPr>
+          <p:cNvPr id="35" name="PlaceHolder 5"/>
           <p:cNvSpPr>
             <a:spLocks noGrp="1"/>
           </p:cNvSpPr>
@@ -509,18 +476,15 @@
             <a:normAutofit/>
           </a:bodyPr>
           <a:p>
-            <a:endParaRPr b="0" lang="sv-SE" sz="2800" spc="-1" strike="noStrike">
-              <a:solidFill>
-                <a:srgbClr val="000000"/>
-              </a:solidFill>
-              <a:latin typeface="Calibri"/>
-            </a:endParaRPr>
-          </a:p>
-        </p:txBody>
-      </p:sp>
-      <p:sp>
-        <p:nvSpPr>
-          <p:cNvPr id="39" name="PlaceHolder 6"/>
+            <a:endParaRPr b="0" lang="en-US" sz="3200" spc="-1" strike="noStrike">
+              <a:latin typeface="Arial"/>
+            </a:endParaRPr>
+          </a:p>
+        </p:txBody>
+      </p:sp>
+      <p:sp>
+        <p:nvSpPr>
+          <p:cNvPr id="36" name="PlaceHolder 6"/>
           <p:cNvSpPr>
             <a:spLocks noGrp="1"/>
           </p:cNvSpPr>
@@ -542,18 +506,15 @@
             <a:normAutofit/>
           </a:bodyPr>
           <a:p>
-            <a:endParaRPr b="0" lang="sv-SE" sz="2800" spc="-1" strike="noStrike">
-              <a:solidFill>
-                <a:srgbClr val="000000"/>
-              </a:solidFill>
-              <a:latin typeface="Calibri"/>
-            </a:endParaRPr>
-          </a:p>
-        </p:txBody>
-      </p:sp>
-      <p:sp>
-        <p:nvSpPr>
-          <p:cNvPr id="40" name="PlaceHolder 7"/>
+            <a:endParaRPr b="0" lang="en-US" sz="3200" spc="-1" strike="noStrike">
+              <a:latin typeface="Arial"/>
+            </a:endParaRPr>
+          </a:p>
+        </p:txBody>
+      </p:sp>
+      <p:sp>
+        <p:nvSpPr>
+          <p:cNvPr id="37" name="PlaceHolder 7"/>
           <p:cNvSpPr>
             <a:spLocks noGrp="1"/>
           </p:cNvSpPr>
@@ -575,11 +536,8 @@
             <a:normAutofit/>
           </a:bodyPr>
           <a:p>
-            <a:endParaRPr b="0" lang="sv-SE" sz="2800" spc="-1" strike="noStrike">
-              <a:solidFill>
-                <a:srgbClr val="000000"/>
-              </a:solidFill>
-              <a:latin typeface="Calibri"/>
+            <a:endParaRPr b="0" lang="en-US" sz="3200" spc="-1" strike="noStrike">
+              <a:latin typeface="Arial"/>
             </a:endParaRPr>
           </a:p>
         </p:txBody>
@@ -608,7 +566,7 @@
       </p:grpSpPr>
       <p:sp>
         <p:nvSpPr>
-          <p:cNvPr id="5" name="PlaceHolder 1"/>
+          <p:cNvPr id="2" name="PlaceHolder 1"/>
           <p:cNvSpPr>
             <a:spLocks noGrp="1"/>
           </p:cNvSpPr>
@@ -619,7 +577,7 @@
         <p:spPr>
           <a:xfrm>
             <a:off x="1523880" y="1122480"/>
-            <a:ext cx="9143640" cy="2387160"/>
+            <a:ext cx="9143280" cy="2386800"/>
           </a:xfrm>
           <a:prstGeom prst="rect">
             <a:avLst/>
@@ -628,18 +586,16 @@
         <p:txBody>
           <a:bodyPr lIns="0" rIns="0" tIns="0" bIns="0" anchor="ctr"/>
           <a:p>
-            <a:endParaRPr b="0" lang="sv-SE" sz="1800" spc="-1" strike="noStrike">
-              <a:solidFill>
-                <a:srgbClr val="000000"/>
-              </a:solidFill>
-              <a:latin typeface="Calibri"/>
-            </a:endParaRPr>
-          </a:p>
-        </p:txBody>
-      </p:sp>
-      <p:sp>
-        <p:nvSpPr>
-          <p:cNvPr id="6" name="PlaceHolder 2"/>
+            <a:pPr algn="ctr"/>
+            <a:endParaRPr b="0" lang="en-US" sz="4400" spc="-1" strike="noStrike">
+              <a:latin typeface="Arial"/>
+            </a:endParaRPr>
+          </a:p>
+        </p:txBody>
+      </p:sp>
+      <p:sp>
+        <p:nvSpPr>
+          <p:cNvPr id="3" name="PlaceHolder 2"/>
           <p:cNvSpPr>
             <a:spLocks noGrp="1"/>
           </p:cNvSpPr>
@@ -690,7 +646,7 @@
       </p:grpSpPr>
       <p:sp>
         <p:nvSpPr>
-          <p:cNvPr id="7" name="PlaceHolder 1"/>
+          <p:cNvPr id="4" name="PlaceHolder 1"/>
           <p:cNvSpPr>
             <a:spLocks noGrp="1"/>
           </p:cNvSpPr>
@@ -701,7 +657,7 @@
         <p:spPr>
           <a:xfrm>
             <a:off x="1523880" y="1122480"/>
-            <a:ext cx="9143640" cy="2387160"/>
+            <a:ext cx="9143280" cy="2386800"/>
           </a:xfrm>
           <a:prstGeom prst="rect">
             <a:avLst/>
@@ -710,18 +666,16 @@
         <p:txBody>
           <a:bodyPr lIns="0" rIns="0" tIns="0" bIns="0" anchor="ctr"/>
           <a:p>
-            <a:endParaRPr b="0" lang="sv-SE" sz="1800" spc="-1" strike="noStrike">
-              <a:solidFill>
-                <a:srgbClr val="000000"/>
-              </a:solidFill>
-              <a:latin typeface="Calibri"/>
-            </a:endParaRPr>
-          </a:p>
-        </p:txBody>
-      </p:sp>
-      <p:sp>
-        <p:nvSpPr>
-          <p:cNvPr id="8" name="PlaceHolder 2"/>
+            <a:pPr algn="ctr"/>
+            <a:endParaRPr b="0" lang="en-US" sz="4400" spc="-1" strike="noStrike">
+              <a:latin typeface="Arial"/>
+            </a:endParaRPr>
+          </a:p>
+        </p:txBody>
+      </p:sp>
+      <p:sp>
+        <p:nvSpPr>
+          <p:cNvPr id="5" name="PlaceHolder 2"/>
           <p:cNvSpPr>
             <a:spLocks noGrp="1"/>
           </p:cNvSpPr>
@@ -743,11 +697,8 @@
             <a:normAutofit/>
           </a:bodyPr>
           <a:p>
-            <a:endParaRPr b="0" lang="sv-SE" sz="2800" spc="-1" strike="noStrike">
-              <a:solidFill>
-                <a:srgbClr val="000000"/>
-              </a:solidFill>
-              <a:latin typeface="Calibri"/>
+            <a:endParaRPr b="0" lang="en-US" sz="3200" spc="-1" strike="noStrike">
+              <a:latin typeface="Arial"/>
             </a:endParaRPr>
           </a:p>
         </p:txBody>
@@ -776,7 +727,7 @@
       </p:grpSpPr>
       <p:sp>
         <p:nvSpPr>
-          <p:cNvPr id="9" name="PlaceHolder 1"/>
+          <p:cNvPr id="6" name="PlaceHolder 1"/>
           <p:cNvSpPr>
             <a:spLocks noGrp="1"/>
           </p:cNvSpPr>
@@ -787,7 +738,7 @@
         <p:spPr>
           <a:xfrm>
             <a:off x="1523880" y="1122480"/>
-            <a:ext cx="9143640" cy="2387160"/>
+            <a:ext cx="9143280" cy="2386800"/>
           </a:xfrm>
           <a:prstGeom prst="rect">
             <a:avLst/>
@@ -796,18 +747,16 @@
         <p:txBody>
           <a:bodyPr lIns="0" rIns="0" tIns="0" bIns="0" anchor="ctr"/>
           <a:p>
-            <a:endParaRPr b="0" lang="sv-SE" sz="1800" spc="-1" strike="noStrike">
-              <a:solidFill>
-                <a:srgbClr val="000000"/>
-              </a:solidFill>
-              <a:latin typeface="Calibri"/>
-            </a:endParaRPr>
-          </a:p>
-        </p:txBody>
-      </p:sp>
-      <p:sp>
-        <p:nvSpPr>
-          <p:cNvPr id="10" name="PlaceHolder 2"/>
+            <a:pPr algn="ctr"/>
+            <a:endParaRPr b="0" lang="en-US" sz="4400" spc="-1" strike="noStrike">
+              <a:latin typeface="Arial"/>
+            </a:endParaRPr>
+          </a:p>
+        </p:txBody>
+      </p:sp>
+      <p:sp>
+        <p:nvSpPr>
+          <p:cNvPr id="7" name="PlaceHolder 2"/>
           <p:cNvSpPr>
             <a:spLocks noGrp="1"/>
           </p:cNvSpPr>
@@ -829,18 +778,15 @@
             <a:normAutofit/>
           </a:bodyPr>
           <a:p>
-            <a:endParaRPr b="0" lang="sv-SE" sz="2800" spc="-1" strike="noStrike">
-              <a:solidFill>
-                <a:srgbClr val="000000"/>
-              </a:solidFill>
-              <a:latin typeface="Calibri"/>
-            </a:endParaRPr>
-          </a:p>
-        </p:txBody>
-      </p:sp>
-      <p:sp>
-        <p:nvSpPr>
-          <p:cNvPr id="11" name="PlaceHolder 3"/>
+            <a:endParaRPr b="0" lang="en-US" sz="3200" spc="-1" strike="noStrike">
+              <a:latin typeface="Arial"/>
+            </a:endParaRPr>
+          </a:p>
+        </p:txBody>
+      </p:sp>
+      <p:sp>
+        <p:nvSpPr>
+          <p:cNvPr id="8" name="PlaceHolder 3"/>
           <p:cNvSpPr>
             <a:spLocks noGrp="1"/>
           </p:cNvSpPr>
@@ -862,11 +808,8 @@
             <a:normAutofit/>
           </a:bodyPr>
           <a:p>
-            <a:endParaRPr b="0" lang="sv-SE" sz="2800" spc="-1" strike="noStrike">
-              <a:solidFill>
-                <a:srgbClr val="000000"/>
-              </a:solidFill>
-              <a:latin typeface="Calibri"/>
+            <a:endParaRPr b="0" lang="en-US" sz="3200" spc="-1" strike="noStrike">
+              <a:latin typeface="Arial"/>
             </a:endParaRPr>
           </a:p>
         </p:txBody>
@@ -895,7 +838,7 @@
       </p:grpSpPr>
       <p:sp>
         <p:nvSpPr>
-          <p:cNvPr id="12" name="PlaceHolder 1"/>
+          <p:cNvPr id="9" name="PlaceHolder 1"/>
           <p:cNvSpPr>
             <a:spLocks noGrp="1"/>
           </p:cNvSpPr>
@@ -906,7 +849,7 @@
         <p:spPr>
           <a:xfrm>
             <a:off x="1523880" y="1122480"/>
-            <a:ext cx="9143640" cy="2387160"/>
+            <a:ext cx="9143280" cy="2386800"/>
           </a:xfrm>
           <a:prstGeom prst="rect">
             <a:avLst/>
@@ -915,11 +858,9 @@
         <p:txBody>
           <a:bodyPr lIns="0" rIns="0" tIns="0" bIns="0" anchor="ctr"/>
           <a:p>
-            <a:endParaRPr b="0" lang="sv-SE" sz="1800" spc="-1" strike="noStrike">
-              <a:solidFill>
-                <a:srgbClr val="000000"/>
-              </a:solidFill>
-              <a:latin typeface="Calibri"/>
+            <a:pPr algn="ctr"/>
+            <a:endParaRPr b="0" lang="en-US" sz="4400" spc="-1" strike="noStrike">
+              <a:latin typeface="Arial"/>
             </a:endParaRPr>
           </a:p>
         </p:txBody>
@@ -948,7 +889,7 @@
       </p:grpSpPr>
       <p:sp>
         <p:nvSpPr>
-          <p:cNvPr id="13" name="PlaceHolder 1"/>
+          <p:cNvPr id="10" name="PlaceHolder 1"/>
           <p:cNvSpPr>
             <a:spLocks noGrp="1"/>
           </p:cNvSpPr>
@@ -959,7 +900,7 @@
         <p:spPr>
           <a:xfrm>
             <a:off x="1523880" y="1122480"/>
-            <a:ext cx="9143640" cy="11066760"/>
+            <a:ext cx="9143280" cy="11064960"/>
           </a:xfrm>
           <a:prstGeom prst="rect">
             <a:avLst/>
@@ -999,7 +940,7 @@
       </p:grpSpPr>
       <p:sp>
         <p:nvSpPr>
-          <p:cNvPr id="14" name="PlaceHolder 1"/>
+          <p:cNvPr id="11" name="PlaceHolder 1"/>
           <p:cNvSpPr>
             <a:spLocks noGrp="1"/>
           </p:cNvSpPr>
@@ -1010,7 +951,7 @@
         <p:spPr>
           <a:xfrm>
             <a:off x="1523880" y="1122480"/>
-            <a:ext cx="9143640" cy="2387160"/>
+            <a:ext cx="9143280" cy="2386800"/>
           </a:xfrm>
           <a:prstGeom prst="rect">
             <a:avLst/>
@@ -1019,18 +960,16 @@
         <p:txBody>
           <a:bodyPr lIns="0" rIns="0" tIns="0" bIns="0" anchor="ctr"/>
           <a:p>
-            <a:endParaRPr b="0" lang="sv-SE" sz="1800" spc="-1" strike="noStrike">
-              <a:solidFill>
-                <a:srgbClr val="000000"/>
-              </a:solidFill>
-              <a:latin typeface="Calibri"/>
-            </a:endParaRPr>
-          </a:p>
-        </p:txBody>
-      </p:sp>
-      <p:sp>
-        <p:nvSpPr>
-          <p:cNvPr id="15" name="PlaceHolder 2"/>
+            <a:pPr algn="ctr"/>
+            <a:endParaRPr b="0" lang="en-US" sz="4400" spc="-1" strike="noStrike">
+              <a:latin typeface="Arial"/>
+            </a:endParaRPr>
+          </a:p>
+        </p:txBody>
+      </p:sp>
+      <p:sp>
+        <p:nvSpPr>
+          <p:cNvPr id="12" name="PlaceHolder 2"/>
           <p:cNvSpPr>
             <a:spLocks noGrp="1"/>
           </p:cNvSpPr>
@@ -1052,18 +991,15 @@
             <a:normAutofit/>
           </a:bodyPr>
           <a:p>
-            <a:endParaRPr b="0" lang="sv-SE" sz="2800" spc="-1" strike="noStrike">
-              <a:solidFill>
-                <a:srgbClr val="000000"/>
-              </a:solidFill>
-              <a:latin typeface="Calibri"/>
-            </a:endParaRPr>
-          </a:p>
-        </p:txBody>
-      </p:sp>
-      <p:sp>
-        <p:nvSpPr>
-          <p:cNvPr id="16" name="PlaceHolder 3"/>
+            <a:endParaRPr b="0" lang="en-US" sz="3200" spc="-1" strike="noStrike">
+              <a:latin typeface="Arial"/>
+            </a:endParaRPr>
+          </a:p>
+        </p:txBody>
+      </p:sp>
+      <p:sp>
+        <p:nvSpPr>
+          <p:cNvPr id="13" name="PlaceHolder 3"/>
           <p:cNvSpPr>
             <a:spLocks noGrp="1"/>
           </p:cNvSpPr>
@@ -1085,18 +1021,15 @@
             <a:normAutofit/>
           </a:bodyPr>
           <a:p>
-            <a:endParaRPr b="0" lang="sv-SE" sz="2800" spc="-1" strike="noStrike">
-              <a:solidFill>
-                <a:srgbClr val="000000"/>
-              </a:solidFill>
-              <a:latin typeface="Calibri"/>
-            </a:endParaRPr>
-          </a:p>
-        </p:txBody>
-      </p:sp>
-      <p:sp>
-        <p:nvSpPr>
-          <p:cNvPr id="17" name="PlaceHolder 4"/>
+            <a:endParaRPr b="0" lang="en-US" sz="3200" spc="-1" strike="noStrike">
+              <a:latin typeface="Arial"/>
+            </a:endParaRPr>
+          </a:p>
+        </p:txBody>
+      </p:sp>
+      <p:sp>
+        <p:nvSpPr>
+          <p:cNvPr id="14" name="PlaceHolder 4"/>
           <p:cNvSpPr>
             <a:spLocks noGrp="1"/>
           </p:cNvSpPr>
@@ -1118,11 +1051,8 @@
             <a:normAutofit/>
           </a:bodyPr>
           <a:p>
-            <a:endParaRPr b="0" lang="sv-SE" sz="2800" spc="-1" strike="noStrike">
-              <a:solidFill>
-                <a:srgbClr val="000000"/>
-              </a:solidFill>
-              <a:latin typeface="Calibri"/>
+            <a:endParaRPr b="0" lang="en-US" sz="3200" spc="-1" strike="noStrike">
+              <a:latin typeface="Arial"/>
             </a:endParaRPr>
           </a:p>
         </p:txBody>
@@ -1151,7 +1081,7 @@
       </p:grpSpPr>
       <p:sp>
         <p:nvSpPr>
-          <p:cNvPr id="18" name="PlaceHolder 1"/>
+          <p:cNvPr id="15" name="PlaceHolder 1"/>
           <p:cNvSpPr>
             <a:spLocks noGrp="1"/>
           </p:cNvSpPr>
@@ -1162,7 +1092,7 @@
         <p:spPr>
           <a:xfrm>
             <a:off x="1523880" y="1122480"/>
-            <a:ext cx="9143640" cy="2387160"/>
+            <a:ext cx="9143280" cy="2386800"/>
           </a:xfrm>
           <a:prstGeom prst="rect">
             <a:avLst/>
@@ -1171,18 +1101,16 @@
         <p:txBody>
           <a:bodyPr lIns="0" rIns="0" tIns="0" bIns="0" anchor="ctr"/>
           <a:p>
-            <a:endParaRPr b="0" lang="sv-SE" sz="1800" spc="-1" strike="noStrike">
-              <a:solidFill>
-                <a:srgbClr val="000000"/>
-              </a:solidFill>
-              <a:latin typeface="Calibri"/>
-            </a:endParaRPr>
-          </a:p>
-        </p:txBody>
-      </p:sp>
-      <p:sp>
-        <p:nvSpPr>
-          <p:cNvPr id="19" name="PlaceHolder 2"/>
+            <a:pPr algn="ctr"/>
+            <a:endParaRPr b="0" lang="en-US" sz="4400" spc="-1" strike="noStrike">
+              <a:latin typeface="Arial"/>
+            </a:endParaRPr>
+          </a:p>
+        </p:txBody>
+      </p:sp>
+      <p:sp>
+        <p:nvSpPr>
+          <p:cNvPr id="16" name="PlaceHolder 2"/>
           <p:cNvSpPr>
             <a:spLocks noGrp="1"/>
           </p:cNvSpPr>
@@ -1204,18 +1132,15 @@
             <a:normAutofit/>
           </a:bodyPr>
           <a:p>
-            <a:endParaRPr b="0" lang="sv-SE" sz="2800" spc="-1" strike="noStrike">
-              <a:solidFill>
-                <a:srgbClr val="000000"/>
-              </a:solidFill>
-              <a:latin typeface="Calibri"/>
-            </a:endParaRPr>
-          </a:p>
-        </p:txBody>
-      </p:sp>
-      <p:sp>
-        <p:nvSpPr>
-          <p:cNvPr id="20" name="PlaceHolder 3"/>
+            <a:endParaRPr b="0" lang="en-US" sz="3200" spc="-1" strike="noStrike">
+              <a:latin typeface="Arial"/>
+            </a:endParaRPr>
+          </a:p>
+        </p:txBody>
+      </p:sp>
+      <p:sp>
+        <p:nvSpPr>
+          <p:cNvPr id="17" name="PlaceHolder 3"/>
           <p:cNvSpPr>
             <a:spLocks noGrp="1"/>
           </p:cNvSpPr>
@@ -1237,18 +1162,15 @@
             <a:normAutofit/>
           </a:bodyPr>
           <a:p>
-            <a:endParaRPr b="0" lang="sv-SE" sz="2800" spc="-1" strike="noStrike">
-              <a:solidFill>
-                <a:srgbClr val="000000"/>
-              </a:solidFill>
-              <a:latin typeface="Calibri"/>
-            </a:endParaRPr>
-          </a:p>
-        </p:txBody>
-      </p:sp>
-      <p:sp>
-        <p:nvSpPr>
-          <p:cNvPr id="21" name="PlaceHolder 4"/>
+            <a:endParaRPr b="0" lang="en-US" sz="3200" spc="-1" strike="noStrike">
+              <a:latin typeface="Arial"/>
+            </a:endParaRPr>
+          </a:p>
+        </p:txBody>
+      </p:sp>
+      <p:sp>
+        <p:nvSpPr>
+          <p:cNvPr id="18" name="PlaceHolder 4"/>
           <p:cNvSpPr>
             <a:spLocks noGrp="1"/>
           </p:cNvSpPr>
@@ -1270,11 +1192,8 @@
             <a:normAutofit/>
           </a:bodyPr>
           <a:p>
-            <a:endParaRPr b="0" lang="sv-SE" sz="2800" spc="-1" strike="noStrike">
-              <a:solidFill>
-                <a:srgbClr val="000000"/>
-              </a:solidFill>
-              <a:latin typeface="Calibri"/>
+            <a:endParaRPr b="0" lang="en-US" sz="3200" spc="-1" strike="noStrike">
+              <a:latin typeface="Arial"/>
             </a:endParaRPr>
           </a:p>
         </p:txBody>
@@ -1303,7 +1222,7 @@
       </p:grpSpPr>
       <p:sp>
         <p:nvSpPr>
-          <p:cNvPr id="22" name="PlaceHolder 1"/>
+          <p:cNvPr id="19" name="PlaceHolder 1"/>
           <p:cNvSpPr>
             <a:spLocks noGrp="1"/>
           </p:cNvSpPr>
@@ -1314,7 +1233,7 @@
         <p:spPr>
           <a:xfrm>
             <a:off x="1523880" y="1122480"/>
-            <a:ext cx="9143640" cy="2387160"/>
+            <a:ext cx="9143280" cy="2386800"/>
           </a:xfrm>
           <a:prstGeom prst="rect">
             <a:avLst/>
@@ -1323,18 +1242,16 @@
         <p:txBody>
           <a:bodyPr lIns="0" rIns="0" tIns="0" bIns="0" anchor="ctr"/>
           <a:p>
-            <a:endParaRPr b="0" lang="sv-SE" sz="1800" spc="-1" strike="noStrike">
-              <a:solidFill>
-                <a:srgbClr val="000000"/>
-              </a:solidFill>
-              <a:latin typeface="Calibri"/>
-            </a:endParaRPr>
-          </a:p>
-        </p:txBody>
-      </p:sp>
-      <p:sp>
-        <p:nvSpPr>
-          <p:cNvPr id="23" name="PlaceHolder 2"/>
+            <a:pPr algn="ctr"/>
+            <a:endParaRPr b="0" lang="en-US" sz="4400" spc="-1" strike="noStrike">
+              <a:latin typeface="Arial"/>
+            </a:endParaRPr>
+          </a:p>
+        </p:txBody>
+      </p:sp>
+      <p:sp>
+        <p:nvSpPr>
+          <p:cNvPr id="20" name="PlaceHolder 2"/>
           <p:cNvSpPr>
             <a:spLocks noGrp="1"/>
           </p:cNvSpPr>
@@ -1356,18 +1273,15 @@
             <a:normAutofit/>
           </a:bodyPr>
           <a:p>
-            <a:endParaRPr b="0" lang="sv-SE" sz="2800" spc="-1" strike="noStrike">
-              <a:solidFill>
-                <a:srgbClr val="000000"/>
-              </a:solidFill>
-              <a:latin typeface="Calibri"/>
-            </a:endParaRPr>
-          </a:p>
-        </p:txBody>
-      </p:sp>
-      <p:sp>
-        <p:nvSpPr>
-          <p:cNvPr id="24" name="PlaceHolder 3"/>
+            <a:endParaRPr b="0" lang="en-US" sz="3200" spc="-1" strike="noStrike">
+              <a:latin typeface="Arial"/>
+            </a:endParaRPr>
+          </a:p>
+        </p:txBody>
+      </p:sp>
+      <p:sp>
+        <p:nvSpPr>
+          <p:cNvPr id="21" name="PlaceHolder 3"/>
           <p:cNvSpPr>
             <a:spLocks noGrp="1"/>
           </p:cNvSpPr>
@@ -1389,18 +1303,15 @@
             <a:normAutofit/>
           </a:bodyPr>
           <a:p>
-            <a:endParaRPr b="0" lang="sv-SE" sz="2800" spc="-1" strike="noStrike">
-              <a:solidFill>
-                <a:srgbClr val="000000"/>
-              </a:solidFill>
-              <a:latin typeface="Calibri"/>
-            </a:endParaRPr>
-          </a:p>
-        </p:txBody>
-      </p:sp>
-      <p:sp>
-        <p:nvSpPr>
-          <p:cNvPr id="25" name="PlaceHolder 4"/>
+            <a:endParaRPr b="0" lang="en-US" sz="3200" spc="-1" strike="noStrike">
+              <a:latin typeface="Arial"/>
+            </a:endParaRPr>
+          </a:p>
+        </p:txBody>
+      </p:sp>
+      <p:sp>
+        <p:nvSpPr>
+          <p:cNvPr id="22" name="PlaceHolder 4"/>
           <p:cNvSpPr>
             <a:spLocks noGrp="1"/>
           </p:cNvSpPr>
@@ -1422,11 +1333,8 @@
             <a:normAutofit/>
           </a:bodyPr>
           <a:p>
-            <a:endParaRPr b="0" lang="sv-SE" sz="2800" spc="-1" strike="noStrike">
-              <a:solidFill>
-                <a:srgbClr val="000000"/>
-              </a:solidFill>
-              <a:latin typeface="Calibri"/>
+            <a:endParaRPr b="0" lang="en-US" sz="3200" spc="-1" strike="noStrike">
+              <a:latin typeface="Arial"/>
             </a:endParaRPr>
           </a:p>
         </p:txBody>
@@ -1473,34 +1381,23 @@
         <p:spPr>
           <a:xfrm>
             <a:off x="1523880" y="1122480"/>
-            <a:ext cx="9143640" cy="2387160"/>
-          </a:xfrm>
-          <a:prstGeom prst="rect">
-            <a:avLst/>
-          </a:prstGeom>
-        </p:spPr>
-        <p:txBody>
-          <a:bodyPr anchor="b"/>
-          <a:p>
-            <a:pPr algn="ctr">
-              <a:lnSpc>
-                <a:spcPct val="90000"/>
-              </a:lnSpc>
-            </a:pPr>
+            <a:ext cx="9143280" cy="2386800"/>
+          </a:xfrm>
+          <a:prstGeom prst="rect">
+            <a:avLst/>
+          </a:prstGeom>
+        </p:spPr>
+        <p:txBody>
+          <a:bodyPr lIns="0" rIns="0" tIns="0" bIns="0" anchor="ctr"/>
+          <a:p>
             <a:r>
-              <a:rPr b="0" lang="sv-SE" sz="6000" spc="-1" strike="noStrike">
-                <a:solidFill>
-                  <a:srgbClr val="000000"/>
-                </a:solidFill>
-                <a:latin typeface="Calibri Light"/>
+              <a:rPr b="0" lang="en-US" sz="1800" spc="-1" strike="noStrike">
+                <a:latin typeface="Arial"/>
               </a:rPr>
-              <a:t>Klicka här för att ändra mall för rubrikformat</a:t>
+              <a:t>Click to edit the title text format</a:t>
             </a:r>
-            <a:endParaRPr b="0" lang="sv-SE" sz="6000" spc="-1" strike="noStrike">
-              <a:solidFill>
-                <a:srgbClr val="000000"/>
-              </a:solidFill>
-              <a:latin typeface="Calibri"/>
+            <a:endParaRPr b="0" lang="en-US" sz="1800" spc="-1" strike="noStrike">
+              <a:latin typeface="Arial"/>
             </a:endParaRPr>
           </a:p>
         </p:txBody>
@@ -1508,118 +1405,6 @@
       <p:sp>
         <p:nvSpPr>
           <p:cNvPr id="1" name="PlaceHolder 2"/>
-          <p:cNvSpPr>
-            <a:spLocks noGrp="1"/>
-          </p:cNvSpPr>
-          <p:nvPr>
-            <p:ph type="dt"/>
-          </p:nvPr>
-        </p:nvSpPr>
-        <p:spPr>
-          <a:xfrm>
-            <a:off x="838080" y="6356520"/>
-            <a:ext cx="2742840" cy="364680"/>
-          </a:xfrm>
-          <a:prstGeom prst="rect">
-            <a:avLst/>
-          </a:prstGeom>
-        </p:spPr>
-        <p:txBody>
-          <a:bodyPr anchor="ctr"/>
-          <a:p>
-            <a:pPr>
-              <a:lnSpc>
-                <a:spcPct val="100000"/>
-              </a:lnSpc>
-            </a:pPr>
-            <a:fld id="{0928CF28-229C-4265-826A-07CAECD3605F}" type="datetime">
-              <a:rPr b="0" lang="en-US" sz="1200" spc="-1" strike="noStrike">
-                <a:solidFill>
-                  <a:srgbClr val="8b8b8b"/>
-                </a:solidFill>
-                <a:latin typeface="Calibri"/>
-              </a:rPr>
-              <a:t>1/28/19</a:t>
-            </a:fld>
-            <a:endParaRPr b="0" lang="en-US" sz="1200" spc="-1" strike="noStrike">
-              <a:latin typeface="Times New Roman"/>
-            </a:endParaRPr>
-          </a:p>
-        </p:txBody>
-      </p:sp>
-      <p:sp>
-        <p:nvSpPr>
-          <p:cNvPr id="2" name="PlaceHolder 3"/>
-          <p:cNvSpPr>
-            <a:spLocks noGrp="1"/>
-          </p:cNvSpPr>
-          <p:nvPr>
-            <p:ph type="ftr"/>
-          </p:nvPr>
-        </p:nvSpPr>
-        <p:spPr>
-          <a:xfrm>
-            <a:off x="4038480" y="6356520"/>
-            <a:ext cx="4114440" cy="364680"/>
-          </a:xfrm>
-          <a:prstGeom prst="rect">
-            <a:avLst/>
-          </a:prstGeom>
-        </p:spPr>
-        <p:txBody>
-          <a:bodyPr anchor="ctr"/>
-          <a:p>
-            <a:endParaRPr b="0" lang="en-US" sz="2400" spc="-1" strike="noStrike">
-              <a:latin typeface="Times New Roman"/>
-            </a:endParaRPr>
-          </a:p>
-        </p:txBody>
-      </p:sp>
-      <p:sp>
-        <p:nvSpPr>
-          <p:cNvPr id="3" name="PlaceHolder 4"/>
-          <p:cNvSpPr>
-            <a:spLocks noGrp="1"/>
-          </p:cNvSpPr>
-          <p:nvPr>
-            <p:ph type="sldNum"/>
-          </p:nvPr>
-        </p:nvSpPr>
-        <p:spPr>
-          <a:xfrm>
-            <a:off x="8610480" y="6356520"/>
-            <a:ext cx="2742840" cy="364680"/>
-          </a:xfrm>
-          <a:prstGeom prst="rect">
-            <a:avLst/>
-          </a:prstGeom>
-        </p:spPr>
-        <p:txBody>
-          <a:bodyPr anchor="ctr"/>
-          <a:p>
-            <a:pPr algn="r">
-              <a:lnSpc>
-                <a:spcPct val="100000"/>
-              </a:lnSpc>
-            </a:pPr>
-            <a:fld id="{1443C8AD-2B8B-4D95-9A2D-82F7CCE5A3A8}" type="slidenum">
-              <a:rPr b="0" lang="en-US" sz="1200" spc="-1" strike="noStrike">
-                <a:solidFill>
-                  <a:srgbClr val="8b8b8b"/>
-                </a:solidFill>
-                <a:latin typeface="Calibri"/>
-              </a:rPr>
-              <a:t>1</a:t>
-            </a:fld>
-            <a:endParaRPr b="0" lang="en-US" sz="1200" spc="-1" strike="noStrike">
-              <a:latin typeface="Times New Roman"/>
-            </a:endParaRPr>
-          </a:p>
-        </p:txBody>
-      </p:sp>
-      <p:sp>
-        <p:nvSpPr>
-          <p:cNvPr id="4" name="PlaceHolder 5"/>
           <p:cNvSpPr>
             <a:spLocks noGrp="1"/>
           </p:cNvSpPr>
@@ -1653,19 +1438,13 @@
               <a:buChar char=""/>
             </a:pPr>
             <a:r>
-              <a:rPr b="0" lang="sv-SE" sz="2800" spc="-1" strike="noStrike">
-                <a:solidFill>
-                  <a:srgbClr val="000000"/>
-                </a:solidFill>
-                <a:latin typeface="Calibri"/>
+              <a:rPr b="0" lang="en-US" sz="3200" spc="-1" strike="noStrike">
+                <a:latin typeface="Arial"/>
               </a:rPr>
               <a:t>Click to edit the outline text format</a:t>
             </a:r>
-            <a:endParaRPr b="0" lang="sv-SE" sz="2800" spc="-1" strike="noStrike">
-              <a:solidFill>
-                <a:srgbClr val="000000"/>
-              </a:solidFill>
-              <a:latin typeface="Calibri"/>
+            <a:endParaRPr b="0" lang="en-US" sz="3200" spc="-1" strike="noStrike">
+              <a:latin typeface="Arial"/>
             </a:endParaRPr>
           </a:p>
           <a:p>
@@ -1681,19 +1460,13 @@
               <a:buChar char=""/>
             </a:pPr>
             <a:r>
-              <a:rPr b="0" lang="sv-SE" sz="2000" spc="-1" strike="noStrike">
-                <a:solidFill>
-                  <a:srgbClr val="000000"/>
-                </a:solidFill>
-                <a:latin typeface="Calibri"/>
+              <a:rPr b="0" lang="en-US" sz="2800" spc="-1" strike="noStrike">
+                <a:latin typeface="Arial"/>
               </a:rPr>
               <a:t>Second Outline Level</a:t>
             </a:r>
-            <a:endParaRPr b="0" lang="sv-SE" sz="2000" spc="-1" strike="noStrike">
-              <a:solidFill>
-                <a:srgbClr val="000000"/>
-              </a:solidFill>
-              <a:latin typeface="Calibri"/>
+            <a:endParaRPr b="0" lang="en-US" sz="2800" spc="-1" strike="noStrike">
+              <a:latin typeface="Arial"/>
             </a:endParaRPr>
           </a:p>
           <a:p>
@@ -1709,19 +1482,13 @@
               <a:buChar char=""/>
             </a:pPr>
             <a:r>
-              <a:rPr b="0" lang="sv-SE" sz="1800" spc="-1" strike="noStrike">
-                <a:solidFill>
-                  <a:srgbClr val="000000"/>
-                </a:solidFill>
-                <a:latin typeface="Calibri"/>
+              <a:rPr b="0" lang="en-US" sz="2400" spc="-1" strike="noStrike">
+                <a:latin typeface="Arial"/>
               </a:rPr>
               <a:t>Third Outline Level</a:t>
             </a:r>
-            <a:endParaRPr b="0" lang="sv-SE" sz="1800" spc="-1" strike="noStrike">
-              <a:solidFill>
-                <a:srgbClr val="000000"/>
-              </a:solidFill>
-              <a:latin typeface="Calibri"/>
+            <a:endParaRPr b="0" lang="en-US" sz="2400" spc="-1" strike="noStrike">
+              <a:latin typeface="Arial"/>
             </a:endParaRPr>
           </a:p>
           <a:p>
@@ -1737,19 +1504,13 @@
               <a:buChar char=""/>
             </a:pPr>
             <a:r>
-              <a:rPr b="0" lang="sv-SE" sz="1800" spc="-1" strike="noStrike">
-                <a:solidFill>
-                  <a:srgbClr val="000000"/>
-                </a:solidFill>
-                <a:latin typeface="Calibri"/>
+              <a:rPr b="0" lang="en-US" sz="2000" spc="-1" strike="noStrike">
+                <a:latin typeface="Arial"/>
               </a:rPr>
               <a:t>Fourth Outline Level</a:t>
             </a:r>
-            <a:endParaRPr b="0" lang="sv-SE" sz="1800" spc="-1" strike="noStrike">
-              <a:solidFill>
-                <a:srgbClr val="000000"/>
-              </a:solidFill>
-              <a:latin typeface="Calibri"/>
+            <a:endParaRPr b="0" lang="en-US" sz="2000" spc="-1" strike="noStrike">
+              <a:latin typeface="Arial"/>
             </a:endParaRPr>
           </a:p>
           <a:p>
@@ -1765,19 +1526,13 @@
               <a:buChar char=""/>
             </a:pPr>
             <a:r>
-              <a:rPr b="0" lang="sv-SE" sz="2000" spc="-1" strike="noStrike">
-                <a:solidFill>
-                  <a:srgbClr val="000000"/>
-                </a:solidFill>
-                <a:latin typeface="Calibri"/>
+              <a:rPr b="0" lang="en-US" sz="2000" spc="-1" strike="noStrike">
+                <a:latin typeface="Arial"/>
               </a:rPr>
               <a:t>Fifth Outline Level</a:t>
             </a:r>
-            <a:endParaRPr b="0" lang="sv-SE" sz="2000" spc="-1" strike="noStrike">
-              <a:solidFill>
-                <a:srgbClr val="000000"/>
-              </a:solidFill>
-              <a:latin typeface="Calibri"/>
+            <a:endParaRPr b="0" lang="en-US" sz="2000" spc="-1" strike="noStrike">
+              <a:latin typeface="Arial"/>
             </a:endParaRPr>
           </a:p>
           <a:p>
@@ -1793,19 +1548,13 @@
               <a:buChar char=""/>
             </a:pPr>
             <a:r>
-              <a:rPr b="0" lang="sv-SE" sz="2000" spc="-1" strike="noStrike">
-                <a:solidFill>
-                  <a:srgbClr val="000000"/>
-                </a:solidFill>
-                <a:latin typeface="Calibri"/>
+              <a:rPr b="0" lang="en-US" sz="2000" spc="-1" strike="noStrike">
+                <a:latin typeface="Arial"/>
               </a:rPr>
               <a:t>Sixth Outline Level</a:t>
             </a:r>
-            <a:endParaRPr b="0" lang="sv-SE" sz="2000" spc="-1" strike="noStrike">
-              <a:solidFill>
-                <a:srgbClr val="000000"/>
-              </a:solidFill>
-              <a:latin typeface="Calibri"/>
+            <a:endParaRPr b="0" lang="en-US" sz="2000" spc="-1" strike="noStrike">
+              <a:latin typeface="Arial"/>
             </a:endParaRPr>
           </a:p>
           <a:p>
@@ -1821,19 +1570,13 @@
               <a:buChar char=""/>
             </a:pPr>
             <a:r>
-              <a:rPr b="0" lang="sv-SE" sz="2000" spc="-1" strike="noStrike">
-                <a:solidFill>
-                  <a:srgbClr val="000000"/>
-                </a:solidFill>
-                <a:latin typeface="Calibri"/>
+              <a:rPr b="0" lang="en-US" sz="2000" spc="-1" strike="noStrike">
+                <a:latin typeface="Arial"/>
               </a:rPr>
               <a:t>Seventh Outline Level</a:t>
             </a:r>
-            <a:endParaRPr b="0" lang="sv-SE" sz="2000" spc="-1" strike="noStrike">
-              <a:solidFill>
-                <a:srgbClr val="000000"/>
-              </a:solidFill>
-              <a:latin typeface="Calibri"/>
+            <a:endParaRPr b="0" lang="en-US" sz="2000" spc="-1" strike="noStrike">
+              <a:latin typeface="Arial"/>
             </a:endParaRPr>
           </a:p>
         </p:txBody>
@@ -1877,19 +1620,21 @@
       </p:grpSpPr>
       <p:sp>
         <p:nvSpPr>
-          <p:cNvPr id="41" name="CustomShape 1"/>
+          <p:cNvPr id="38" name="CustomShape 1"/>
           <p:cNvSpPr/>
           <p:nvPr/>
         </p:nvSpPr>
         <p:spPr>
           <a:xfrm>
             <a:off x="4661640" y="100800"/>
-            <a:ext cx="2986200" cy="754560"/>
-          </a:xfrm>
-          <a:prstGeom prst="rect">
-            <a:avLst/>
-          </a:prstGeom>
-          <a:ln/>
+            <a:ext cx="2985840" cy="754200"/>
+          </a:xfrm>
+          <a:prstGeom prst="rect">
+            <a:avLst/>
+          </a:prstGeom>
+          <a:ln>
+            <a:round/>
+          </a:ln>
         </p:spPr>
         <p:style>
           <a:lnRef idx="2">
@@ -1917,6 +1662,7 @@
                   <a:srgbClr val="000000"/>
                 </a:solidFill>
                 <a:latin typeface="Calibri"/>
+                <a:ea typeface="DejaVu Sans"/>
               </a:rPr>
               <a:t>Work Breakdown Structure</a:t>
             </a:r>
@@ -1928,19 +1674,21 @@
       </p:sp>
       <p:sp>
         <p:nvSpPr>
-          <p:cNvPr id="42" name="CustomShape 2"/>
+          <p:cNvPr id="39" name="CustomShape 2"/>
           <p:cNvSpPr/>
           <p:nvPr/>
         </p:nvSpPr>
         <p:spPr>
           <a:xfrm>
             <a:off x="1290600" y="1335240"/>
-            <a:ext cx="1360080" cy="801720"/>
-          </a:xfrm>
-          <a:prstGeom prst="rect">
-            <a:avLst/>
-          </a:prstGeom>
-          <a:ln/>
+            <a:ext cx="1359720" cy="801360"/>
+          </a:xfrm>
+          <a:prstGeom prst="rect">
+            <a:avLst/>
+          </a:prstGeom>
+          <a:ln>
+            <a:round/>
+          </a:ln>
         </p:spPr>
         <p:style>
           <a:lnRef idx="2">
@@ -1968,6 +1716,7 @@
                   <a:srgbClr val="000000"/>
                 </a:solidFill>
                 <a:latin typeface="Calibri"/>
+                <a:ea typeface="DejaVu Sans"/>
               </a:rPr>
               <a:t>Creating the container (10%) </a:t>
             </a:r>
@@ -1979,19 +1728,21 @@
       </p:sp>
       <p:sp>
         <p:nvSpPr>
-          <p:cNvPr id="43" name="CustomShape 3"/>
+          <p:cNvPr id="40" name="CustomShape 3"/>
           <p:cNvSpPr/>
           <p:nvPr/>
         </p:nvSpPr>
         <p:spPr>
           <a:xfrm>
             <a:off x="2067840" y="2587320"/>
-            <a:ext cx="1165680" cy="609840"/>
-          </a:xfrm>
-          <a:prstGeom prst="rect">
-            <a:avLst/>
-          </a:prstGeom>
-          <a:ln w="19080"/>
+            <a:ext cx="1165320" cy="609480"/>
+          </a:xfrm>
+          <a:prstGeom prst="rect">
+            <a:avLst/>
+          </a:prstGeom>
+          <a:ln w="19080">
+            <a:round/>
+          </a:ln>
         </p:spPr>
         <p:style>
           <a:lnRef idx="2">
@@ -2019,6 +1770,7 @@
                   <a:srgbClr val="000000"/>
                 </a:solidFill>
                 <a:latin typeface="Calibri"/>
+                <a:ea typeface="DejaVu Sans"/>
               </a:rPr>
               <a:t>Creating a container with ubuntu</a:t>
             </a:r>
@@ -2030,19 +1782,21 @@
       </p:sp>
       <p:sp>
         <p:nvSpPr>
-          <p:cNvPr id="44" name="CustomShape 4"/>
+          <p:cNvPr id="41" name="CustomShape 4"/>
           <p:cNvSpPr/>
           <p:nvPr/>
         </p:nvSpPr>
         <p:spPr>
           <a:xfrm>
             <a:off x="3981240" y="1335240"/>
-            <a:ext cx="1360080" cy="799560"/>
-          </a:xfrm>
-          <a:prstGeom prst="rect">
-            <a:avLst/>
-          </a:prstGeom>
-          <a:ln/>
+            <a:ext cx="1359720" cy="799200"/>
+          </a:xfrm>
+          <a:prstGeom prst="rect">
+            <a:avLst/>
+          </a:prstGeom>
+          <a:ln>
+            <a:round/>
+          </a:ln>
         </p:spPr>
         <p:style>
           <a:lnRef idx="2">
@@ -2070,6 +1824,7 @@
                   <a:srgbClr val="000000"/>
                 </a:solidFill>
                 <a:latin typeface="Calibri"/>
+                <a:ea typeface="DejaVu Sans"/>
               </a:rPr>
               <a:t>Creating the pipeline</a:t>
             </a:r>
@@ -2089,6 +1844,7 @@
                   <a:srgbClr val="000000"/>
                 </a:solidFill>
                 <a:latin typeface="Calibri"/>
+                <a:ea typeface="DejaVu Sans"/>
               </a:rPr>
               <a:t>(40%)</a:t>
             </a:r>
@@ -2100,19 +1856,21 @@
       </p:sp>
       <p:sp>
         <p:nvSpPr>
-          <p:cNvPr id="45" name="CustomShape 5"/>
+          <p:cNvPr id="42" name="CustomShape 5"/>
           <p:cNvSpPr/>
           <p:nvPr/>
         </p:nvSpPr>
         <p:spPr>
           <a:xfrm>
             <a:off x="7065000" y="1333080"/>
-            <a:ext cx="1360080" cy="801720"/>
-          </a:xfrm>
-          <a:prstGeom prst="rect">
-            <a:avLst/>
-          </a:prstGeom>
-          <a:ln/>
+            <a:ext cx="1359720" cy="801360"/>
+          </a:xfrm>
+          <a:prstGeom prst="rect">
+            <a:avLst/>
+          </a:prstGeom>
+          <a:ln>
+            <a:round/>
+          </a:ln>
         </p:spPr>
         <p:style>
           <a:lnRef idx="2">
@@ -2140,6 +1898,7 @@
                   <a:srgbClr val="000000"/>
                 </a:solidFill>
                 <a:latin typeface="Calibri"/>
+                <a:ea typeface="DejaVu Sans"/>
               </a:rPr>
               <a:t>Analysing the data</a:t>
             </a:r>
@@ -2159,6 +1918,7 @@
                   <a:srgbClr val="000000"/>
                 </a:solidFill>
                 <a:latin typeface="Calibri"/>
+                <a:ea typeface="DejaVu Sans"/>
               </a:rPr>
               <a:t>(30%)</a:t>
             </a:r>
@@ -2170,19 +1930,21 @@
       </p:sp>
       <p:sp>
         <p:nvSpPr>
-          <p:cNvPr id="46" name="CustomShape 6"/>
+          <p:cNvPr id="43" name="CustomShape 6"/>
           <p:cNvSpPr/>
           <p:nvPr/>
         </p:nvSpPr>
         <p:spPr>
           <a:xfrm>
             <a:off x="9658440" y="1333080"/>
-            <a:ext cx="1360080" cy="801720"/>
-          </a:xfrm>
-          <a:prstGeom prst="rect">
-            <a:avLst/>
-          </a:prstGeom>
-          <a:ln/>
+            <a:ext cx="1359720" cy="801360"/>
+          </a:xfrm>
+          <a:prstGeom prst="rect">
+            <a:avLst/>
+          </a:prstGeom>
+          <a:ln>
+            <a:round/>
+          </a:ln>
         </p:spPr>
         <p:style>
           <a:lnRef idx="2">
@@ -2210,6 +1972,7 @@
                   <a:srgbClr val="000000"/>
                 </a:solidFill>
                 <a:latin typeface="Calibri"/>
+                <a:ea typeface="DejaVu Sans"/>
               </a:rPr>
               <a:t>Thesis and opposition</a:t>
             </a:r>
@@ -2229,6 +1992,7 @@
                   <a:srgbClr val="000000"/>
                 </a:solidFill>
                 <a:latin typeface="Calibri"/>
+                <a:ea typeface="DejaVu Sans"/>
               </a:rPr>
               <a:t>(20%)</a:t>
             </a:r>
@@ -2240,19 +2004,21 @@
       </p:sp>
       <p:sp>
         <p:nvSpPr>
-          <p:cNvPr id="47" name="CustomShape 7"/>
+          <p:cNvPr id="44" name="CustomShape 7"/>
           <p:cNvSpPr/>
           <p:nvPr/>
         </p:nvSpPr>
         <p:spPr>
           <a:xfrm>
             <a:off x="2067840" y="3660480"/>
-            <a:ext cx="1165680" cy="609840"/>
-          </a:xfrm>
-          <a:prstGeom prst="rect">
-            <a:avLst/>
-          </a:prstGeom>
-          <a:ln w="19080"/>
+            <a:ext cx="1165320" cy="609480"/>
+          </a:xfrm>
+          <a:prstGeom prst="rect">
+            <a:avLst/>
+          </a:prstGeom>
+          <a:ln w="19080">
+            <a:round/>
+          </a:ln>
         </p:spPr>
         <p:style>
           <a:lnRef idx="2">
@@ -2280,6 +2046,7 @@
                   <a:srgbClr val="000000"/>
                 </a:solidFill>
                 <a:latin typeface="Calibri"/>
+                <a:ea typeface="DejaVu Sans"/>
               </a:rPr>
               <a:t>Adding quandenser to the container</a:t>
             </a:r>
@@ -2291,19 +2058,21 @@
       </p:sp>
       <p:sp>
         <p:nvSpPr>
-          <p:cNvPr id="48" name="CustomShape 8"/>
+          <p:cNvPr id="45" name="CustomShape 8"/>
           <p:cNvSpPr/>
           <p:nvPr/>
         </p:nvSpPr>
         <p:spPr>
           <a:xfrm>
             <a:off x="2067840" y="4733640"/>
-            <a:ext cx="1165680" cy="609840"/>
-          </a:xfrm>
-          <a:prstGeom prst="rect">
-            <a:avLst/>
-          </a:prstGeom>
-          <a:ln w="19080"/>
+            <a:ext cx="1165320" cy="609480"/>
+          </a:xfrm>
+          <a:prstGeom prst="rect">
+            <a:avLst/>
+          </a:prstGeom>
+          <a:ln w="19080">
+            <a:round/>
+          </a:ln>
         </p:spPr>
         <p:style>
           <a:lnRef idx="2">
@@ -2331,6 +2100,7 @@
                   <a:srgbClr val="000000"/>
                 </a:solidFill>
                 <a:latin typeface="Calibri"/>
+                <a:ea typeface="DejaVu Sans"/>
               </a:rPr>
               <a:t>Add msconvert to the container</a:t>
             </a:r>
@@ -2342,19 +2112,24 @@
       </p:sp>
       <p:sp>
         <p:nvSpPr>
-          <p:cNvPr id="49" name="CustomShape 9"/>
+          <p:cNvPr id="46" name="CustomShape 9"/>
           <p:cNvSpPr/>
           <p:nvPr/>
         </p:nvSpPr>
         <p:spPr>
           <a:xfrm>
             <a:off x="2067840" y="5806440"/>
-            <a:ext cx="1165680" cy="609840"/>
-          </a:xfrm>
-          <a:prstGeom prst="rect">
-            <a:avLst/>
-          </a:prstGeom>
-          <a:ln w="19080"/>
+            <a:ext cx="1165320" cy="609480"/>
+          </a:xfrm>
+          <a:prstGeom prst="rect">
+            <a:avLst/>
+          </a:prstGeom>
+          <a:ln w="19080">
+            <a:solidFill>
+              <a:srgbClr val="72bf44"/>
+            </a:solidFill>
+            <a:round/>
+          </a:ln>
         </p:spPr>
         <p:style>
           <a:lnRef idx="2">
@@ -2382,6 +2157,7 @@
                   <a:srgbClr val="000000"/>
                 </a:solidFill>
                 <a:latin typeface="Calibri"/>
+                <a:ea typeface="DejaVu Sans"/>
               </a:rPr>
               <a:t>Debug the container</a:t>
             </a:r>
@@ -2393,19 +2169,21 @@
       </p:sp>
       <p:sp>
         <p:nvSpPr>
-          <p:cNvPr id="50" name="CustomShape 10"/>
+          <p:cNvPr id="47" name="CustomShape 10"/>
           <p:cNvSpPr/>
           <p:nvPr/>
         </p:nvSpPr>
         <p:spPr>
           <a:xfrm>
             <a:off x="4758480" y="2587320"/>
-            <a:ext cx="1165680" cy="609840"/>
-          </a:xfrm>
-          <a:prstGeom prst="rect">
-            <a:avLst/>
-          </a:prstGeom>
-          <a:ln w="19080"/>
+            <a:ext cx="1165320" cy="609480"/>
+          </a:xfrm>
+          <a:prstGeom prst="rect">
+            <a:avLst/>
+          </a:prstGeom>
+          <a:ln w="19080">
+            <a:round/>
+          </a:ln>
         </p:spPr>
         <p:style>
           <a:lnRef idx="2">
@@ -2433,6 +2211,7 @@
                   <a:srgbClr val="000000"/>
                 </a:solidFill>
                 <a:latin typeface="Calibri"/>
+                <a:ea typeface="DejaVu Sans"/>
               </a:rPr>
               <a:t>Create a basic pipeline for MS data</a:t>
             </a:r>
@@ -2444,19 +2223,24 @@
       </p:sp>
       <p:sp>
         <p:nvSpPr>
-          <p:cNvPr id="51" name="CustomShape 11"/>
+          <p:cNvPr id="48" name="CustomShape 11"/>
           <p:cNvSpPr/>
           <p:nvPr/>
         </p:nvSpPr>
         <p:spPr>
           <a:xfrm>
             <a:off x="4755960" y="3660480"/>
-            <a:ext cx="1165680" cy="609840"/>
-          </a:xfrm>
-          <a:prstGeom prst="rect">
-            <a:avLst/>
-          </a:prstGeom>
-          <a:ln w="19080"/>
+            <a:ext cx="1165320" cy="609480"/>
+          </a:xfrm>
+          <a:prstGeom prst="rect">
+            <a:avLst/>
+          </a:prstGeom>
+          <a:ln w="19080">
+            <a:solidFill>
+              <a:srgbClr val="72bf44"/>
+            </a:solidFill>
+            <a:round/>
+          </a:ln>
         </p:spPr>
         <p:style>
           <a:lnRef idx="2">
@@ -2484,6 +2268,7 @@
                   <a:srgbClr val="000000"/>
                 </a:solidFill>
                 <a:latin typeface="Calibri"/>
+                <a:ea typeface="DejaVu Sans"/>
               </a:rPr>
               <a:t>Create a GUI for the pipeline</a:t>
             </a:r>
@@ -2495,19 +2280,24 @@
       </p:sp>
       <p:sp>
         <p:nvSpPr>
-          <p:cNvPr id="52" name="CustomShape 12"/>
+          <p:cNvPr id="49" name="CustomShape 12"/>
           <p:cNvSpPr/>
           <p:nvPr/>
         </p:nvSpPr>
         <p:spPr>
           <a:xfrm>
             <a:off x="4755960" y="4733640"/>
-            <a:ext cx="1165680" cy="609840"/>
-          </a:xfrm>
-          <a:prstGeom prst="rect">
-            <a:avLst/>
-          </a:prstGeom>
-          <a:ln w="19080"/>
+            <a:ext cx="1165320" cy="609480"/>
+          </a:xfrm>
+          <a:prstGeom prst="rect">
+            <a:avLst/>
+          </a:prstGeom>
+          <a:ln w="19080">
+            <a:solidFill>
+              <a:srgbClr val="72bf44"/>
+            </a:solidFill>
+            <a:round/>
+          </a:ln>
         </p:spPr>
         <p:style>
           <a:lnRef idx="2">
@@ -2535,6 +2325,7 @@
                   <a:srgbClr val="000000"/>
                 </a:solidFill>
                 <a:latin typeface="Calibri"/>
+                <a:ea typeface="DejaVu Sans"/>
               </a:rPr>
               <a:t>Option to restrict pipeline</a:t>
             </a:r>
@@ -2546,19 +2337,24 @@
       </p:sp>
       <p:sp>
         <p:nvSpPr>
-          <p:cNvPr id="53" name="CustomShape 13"/>
+          <p:cNvPr id="50" name="CustomShape 13"/>
           <p:cNvSpPr/>
           <p:nvPr/>
         </p:nvSpPr>
         <p:spPr>
           <a:xfrm>
             <a:off x="4758480" y="5802840"/>
-            <a:ext cx="1165680" cy="609840"/>
-          </a:xfrm>
-          <a:prstGeom prst="rect">
-            <a:avLst/>
-          </a:prstGeom>
-          <a:ln w="19080"/>
+            <a:ext cx="1165320" cy="609480"/>
+          </a:xfrm>
+          <a:prstGeom prst="rect">
+            <a:avLst/>
+          </a:prstGeom>
+          <a:ln w="19080">
+            <a:solidFill>
+              <a:srgbClr val="72bf44"/>
+            </a:solidFill>
+            <a:round/>
+          </a:ln>
         </p:spPr>
         <p:style>
           <a:lnRef idx="2">
@@ -2586,6 +2382,7 @@
                   <a:srgbClr val="000000"/>
                 </a:solidFill>
                 <a:latin typeface="Calibri"/>
+                <a:ea typeface="DejaVu Sans"/>
               </a:rPr>
               <a:t>Create an installer for the pipeline</a:t>
             </a:r>
@@ -2597,19 +2394,24 @@
       </p:sp>
       <p:sp>
         <p:nvSpPr>
-          <p:cNvPr id="54" name="CustomShape 14"/>
+          <p:cNvPr id="51" name="CustomShape 14"/>
           <p:cNvSpPr/>
           <p:nvPr/>
         </p:nvSpPr>
         <p:spPr>
           <a:xfrm>
             <a:off x="10436040" y="2587320"/>
-            <a:ext cx="1165680" cy="609840"/>
-          </a:xfrm>
-          <a:prstGeom prst="rect">
-            <a:avLst/>
-          </a:prstGeom>
-          <a:ln w="19080"/>
+            <a:ext cx="1165320" cy="609480"/>
+          </a:xfrm>
+          <a:prstGeom prst="rect">
+            <a:avLst/>
+          </a:prstGeom>
+          <a:ln w="19080">
+            <a:solidFill>
+              <a:srgbClr val="0066b3"/>
+            </a:solidFill>
+            <a:round/>
+          </a:ln>
         </p:spPr>
         <p:style>
           <a:lnRef idx="2">
@@ -2637,6 +2439,7 @@
                   <a:srgbClr val="000000"/>
                 </a:solidFill>
                 <a:latin typeface="Calibri"/>
+                <a:ea typeface="DejaVu Sans"/>
               </a:rPr>
               <a:t>Write the thesis</a:t>
             </a:r>
@@ -2648,19 +2451,21 @@
       </p:sp>
       <p:sp>
         <p:nvSpPr>
-          <p:cNvPr id="55" name="CustomShape 15"/>
+          <p:cNvPr id="52" name="CustomShape 15"/>
           <p:cNvSpPr/>
           <p:nvPr/>
         </p:nvSpPr>
         <p:spPr>
           <a:xfrm>
             <a:off x="10436040" y="3660480"/>
-            <a:ext cx="1165680" cy="609840"/>
-          </a:xfrm>
-          <a:prstGeom prst="rect">
-            <a:avLst/>
-          </a:prstGeom>
-          <a:ln w="19080"/>
+            <a:ext cx="1165320" cy="609480"/>
+          </a:xfrm>
+          <a:prstGeom prst="rect">
+            <a:avLst/>
+          </a:prstGeom>
+          <a:ln w="19080">
+            <a:round/>
+          </a:ln>
         </p:spPr>
         <p:style>
           <a:lnRef idx="2">
@@ -2688,6 +2493,7 @@
                   <a:srgbClr val="000000"/>
                 </a:solidFill>
                 <a:latin typeface="Calibri"/>
+                <a:ea typeface="DejaVu Sans"/>
               </a:rPr>
               <a:t>Prepare the presentation</a:t>
             </a:r>
@@ -2699,14 +2505,14 @@
       </p:sp>
       <p:sp>
         <p:nvSpPr>
-          <p:cNvPr id="56" name="CustomShape 16"/>
+          <p:cNvPr id="53" name="CustomShape 16"/>
           <p:cNvSpPr/>
           <p:nvPr/>
         </p:nvSpPr>
         <p:spPr>
           <a:xfrm rot="5400000">
-            <a:off x="5168520" y="348480"/>
-            <a:ext cx="479160" cy="1492920"/>
+            <a:off x="5168880" y="348120"/>
+            <a:ext cx="478800" cy="1492560"/>
           </a:xfrm>
           <a:prstGeom prst="bentConnector3">
             <a:avLst>
@@ -2714,7 +2520,9 @@
             </a:avLst>
           </a:prstGeom>
           <a:noFill/>
-          <a:ln w="38160"/>
+          <a:ln w="38160">
+            <a:round/>
+          </a:ln>
         </p:spPr>
         <p:style>
           <a:lnRef idx="1">
@@ -2731,14 +2539,14 @@
       </p:sp>
       <p:sp>
         <p:nvSpPr>
-          <p:cNvPr id="57" name="CustomShape 17"/>
+          <p:cNvPr id="54" name="CustomShape 17"/>
           <p:cNvSpPr/>
           <p:nvPr/>
         </p:nvSpPr>
         <p:spPr>
           <a:xfrm flipH="1" rot="16200000">
-            <a:off x="6710760" y="299160"/>
-            <a:ext cx="477000" cy="1590120"/>
+            <a:off x="6711120" y="299160"/>
+            <a:ext cx="476640" cy="1589760"/>
           </a:xfrm>
           <a:prstGeom prst="bentConnector3">
             <a:avLst>
@@ -2746,7 +2554,9 @@
             </a:avLst>
           </a:prstGeom>
           <a:noFill/>
-          <a:ln w="38160"/>
+          <a:ln w="38160">
+            <a:round/>
+          </a:ln>
         </p:spPr>
         <p:style>
           <a:lnRef idx="1">
@@ -2763,14 +2573,14 @@
       </p:sp>
       <p:sp>
         <p:nvSpPr>
-          <p:cNvPr id="58" name="CustomShape 18"/>
+          <p:cNvPr id="55" name="CustomShape 18"/>
           <p:cNvSpPr/>
           <p:nvPr/>
         </p:nvSpPr>
         <p:spPr>
           <a:xfrm flipH="1" rot="16200000">
-            <a:off x="8007840" y="-997200"/>
-            <a:ext cx="477000" cy="4183560"/>
+            <a:off x="8008200" y="-996840"/>
+            <a:ext cx="476640" cy="4183200"/>
           </a:xfrm>
           <a:prstGeom prst="bentConnector3">
             <a:avLst>
@@ -2778,7 +2588,9 @@
             </a:avLst>
           </a:prstGeom>
           <a:noFill/>
-          <a:ln w="38160"/>
+          <a:ln w="38160">
+            <a:round/>
+          </a:ln>
         </p:spPr>
         <p:style>
           <a:lnRef idx="1">
@@ -2795,14 +2607,14 @@
       </p:sp>
       <p:sp>
         <p:nvSpPr>
-          <p:cNvPr id="59" name="CustomShape 19"/>
+          <p:cNvPr id="56" name="CustomShape 19"/>
           <p:cNvSpPr/>
           <p:nvPr/>
         </p:nvSpPr>
         <p:spPr>
           <a:xfrm rot="5400000">
-            <a:off x="3823200" y="-996480"/>
-            <a:ext cx="479160" cy="4183560"/>
+            <a:off x="3823560" y="-996480"/>
+            <a:ext cx="478800" cy="4183200"/>
           </a:xfrm>
           <a:prstGeom prst="bentConnector3">
             <a:avLst>
@@ -2810,7 +2622,9 @@
             </a:avLst>
           </a:prstGeom>
           <a:noFill/>
-          <a:ln w="38160"/>
+          <a:ln w="38160">
+            <a:round/>
+          </a:ln>
         </p:spPr>
         <p:style>
           <a:lnRef idx="1">
@@ -2827,20 +2641,22 @@
       </p:sp>
       <p:sp>
         <p:nvSpPr>
-          <p:cNvPr id="60" name="CustomShape 20"/>
+          <p:cNvPr id="57" name="CustomShape 20"/>
           <p:cNvSpPr/>
           <p:nvPr/>
         </p:nvSpPr>
         <p:spPr>
           <a:xfrm flipH="1" rot="16200000">
-            <a:off x="1641240" y="2466000"/>
-            <a:ext cx="754560" cy="96840"/>
+            <a:off x="1641600" y="2466000"/>
+            <a:ext cx="754200" cy="96480"/>
           </a:xfrm>
           <a:prstGeom prst="bentConnector2">
             <a:avLst/>
           </a:prstGeom>
           <a:noFill/>
-          <a:ln w="38160"/>
+          <a:ln w="38160">
+            <a:round/>
+          </a:ln>
         </p:spPr>
         <p:style>
           <a:lnRef idx="1">
@@ -2857,20 +2673,22 @@
       </p:sp>
       <p:sp>
         <p:nvSpPr>
-          <p:cNvPr id="61" name="CustomShape 21"/>
+          <p:cNvPr id="58" name="CustomShape 21"/>
           <p:cNvSpPr/>
           <p:nvPr/>
         </p:nvSpPr>
         <p:spPr>
           <a:xfrm flipH="1" rot="16200000">
-            <a:off x="1104840" y="3002760"/>
-            <a:ext cx="1827720" cy="96840"/>
+            <a:off x="1105200" y="3002760"/>
+            <a:ext cx="1827360" cy="96480"/>
           </a:xfrm>
           <a:prstGeom prst="bentConnector2">
             <a:avLst/>
           </a:prstGeom>
           <a:noFill/>
-          <a:ln w="38160"/>
+          <a:ln w="38160">
+            <a:round/>
+          </a:ln>
         </p:spPr>
         <p:style>
           <a:lnRef idx="1">
@@ -2887,20 +2705,22 @@
       </p:sp>
       <p:sp>
         <p:nvSpPr>
-          <p:cNvPr id="62" name="CustomShape 22"/>
+          <p:cNvPr id="59" name="CustomShape 22"/>
           <p:cNvSpPr/>
           <p:nvPr/>
         </p:nvSpPr>
         <p:spPr>
           <a:xfrm flipH="1" rot="16200000">
-            <a:off x="568080" y="3539160"/>
-            <a:ext cx="2900880" cy="96840"/>
+            <a:off x="568440" y="3539160"/>
+            <a:ext cx="2900520" cy="96480"/>
           </a:xfrm>
           <a:prstGeom prst="bentConnector2">
             <a:avLst/>
           </a:prstGeom>
           <a:noFill/>
-          <a:ln w="38160"/>
+          <a:ln w="38160">
+            <a:round/>
+          </a:ln>
         </p:spPr>
         <p:style>
           <a:lnRef idx="1">
@@ -2917,20 +2737,22 @@
       </p:sp>
       <p:sp>
         <p:nvSpPr>
-          <p:cNvPr id="63" name="CustomShape 23"/>
+          <p:cNvPr id="60" name="CustomShape 23"/>
           <p:cNvSpPr/>
           <p:nvPr/>
         </p:nvSpPr>
         <p:spPr>
           <a:xfrm flipH="1" rot="16200000">
-            <a:off x="31680" y="4075920"/>
-            <a:ext cx="3974040" cy="96840"/>
+            <a:off x="32040" y="4075920"/>
+            <a:ext cx="3973680" cy="96480"/>
           </a:xfrm>
           <a:prstGeom prst="bentConnector2">
             <a:avLst/>
           </a:prstGeom>
           <a:noFill/>
-          <a:ln w="38160"/>
+          <a:ln w="38160">
+            <a:round/>
+          </a:ln>
         </p:spPr>
         <p:style>
           <a:lnRef idx="1">
@@ -2947,20 +2769,22 @@
       </p:sp>
       <p:sp>
         <p:nvSpPr>
-          <p:cNvPr id="64" name="CustomShape 24"/>
+          <p:cNvPr id="61" name="CustomShape 24"/>
           <p:cNvSpPr/>
           <p:nvPr/>
         </p:nvSpPr>
         <p:spPr>
           <a:xfrm flipH="1" rot="16200000">
-            <a:off x="4330800" y="2465280"/>
-            <a:ext cx="757080" cy="96840"/>
+            <a:off x="4331160" y="2465280"/>
+            <a:ext cx="756720" cy="96480"/>
           </a:xfrm>
           <a:prstGeom prst="bentConnector2">
             <a:avLst/>
           </a:prstGeom>
           <a:noFill/>
-          <a:ln w="38160"/>
+          <a:ln w="38160">
+            <a:round/>
+          </a:ln>
         </p:spPr>
         <p:style>
           <a:lnRef idx="1">
@@ -2977,20 +2801,22 @@
       </p:sp>
       <p:sp>
         <p:nvSpPr>
-          <p:cNvPr id="65" name="CustomShape 25"/>
+          <p:cNvPr id="62" name="CustomShape 25"/>
           <p:cNvSpPr/>
           <p:nvPr/>
         </p:nvSpPr>
         <p:spPr>
           <a:xfrm flipH="1" rot="16200000">
-            <a:off x="3793320" y="3003120"/>
-            <a:ext cx="1829880" cy="93960"/>
+            <a:off x="3793680" y="3003120"/>
+            <a:ext cx="1829520" cy="93600"/>
           </a:xfrm>
           <a:prstGeom prst="bentConnector2">
             <a:avLst/>
           </a:prstGeom>
           <a:noFill/>
-          <a:ln w="38160"/>
+          <a:ln w="38160">
+            <a:round/>
+          </a:ln>
         </p:spPr>
         <p:style>
           <a:lnRef idx="1">
@@ -3007,20 +2833,22 @@
       </p:sp>
       <p:sp>
         <p:nvSpPr>
-          <p:cNvPr id="66" name="CustomShape 26"/>
+          <p:cNvPr id="63" name="CustomShape 26"/>
           <p:cNvSpPr/>
           <p:nvPr/>
         </p:nvSpPr>
         <p:spPr>
           <a:xfrm flipH="1" rot="16200000">
-            <a:off x="3256560" y="3539520"/>
-            <a:ext cx="2903040" cy="93960"/>
+            <a:off x="3256920" y="3539520"/>
+            <a:ext cx="2902680" cy="93600"/>
           </a:xfrm>
           <a:prstGeom prst="bentConnector2">
             <a:avLst/>
           </a:prstGeom>
           <a:noFill/>
-          <a:ln w="38160"/>
+          <a:ln w="38160">
+            <a:round/>
+          </a:ln>
         </p:spPr>
         <p:style>
           <a:lnRef idx="1">
@@ -3037,20 +2865,22 @@
       </p:sp>
       <p:sp>
         <p:nvSpPr>
-          <p:cNvPr id="67" name="CustomShape 27"/>
+          <p:cNvPr id="64" name="CustomShape 27"/>
           <p:cNvSpPr/>
           <p:nvPr/>
         </p:nvSpPr>
         <p:spPr>
           <a:xfrm flipH="1" rot="16200000">
-            <a:off x="2723040" y="4072680"/>
-            <a:ext cx="3972240" cy="96840"/>
+            <a:off x="2723400" y="4072680"/>
+            <a:ext cx="3971880" cy="96480"/>
           </a:xfrm>
           <a:prstGeom prst="bentConnector2">
             <a:avLst/>
           </a:prstGeom>
           <a:noFill/>
-          <a:ln w="38160"/>
+          <a:ln w="38160">
+            <a:round/>
+          </a:ln>
         </p:spPr>
         <p:style>
           <a:lnRef idx="1">
@@ -3067,19 +2897,24 @@
       </p:sp>
       <p:sp>
         <p:nvSpPr>
-          <p:cNvPr id="68" name="CustomShape 28"/>
+          <p:cNvPr id="65" name="CustomShape 28"/>
           <p:cNvSpPr/>
           <p:nvPr/>
         </p:nvSpPr>
         <p:spPr>
           <a:xfrm>
             <a:off x="7842240" y="2565360"/>
-            <a:ext cx="1165680" cy="609840"/>
-          </a:xfrm>
-          <a:prstGeom prst="rect">
-            <a:avLst/>
-          </a:prstGeom>
-          <a:ln w="19080"/>
+            <a:ext cx="1165320" cy="609480"/>
+          </a:xfrm>
+          <a:prstGeom prst="rect">
+            <a:avLst/>
+          </a:prstGeom>
+          <a:ln w="19080">
+            <a:solidFill>
+              <a:srgbClr val="72bf44"/>
+            </a:solidFill>
+            <a:round/>
+          </a:ln>
         </p:spPr>
         <p:style>
           <a:lnRef idx="2">
@@ -3107,6 +2942,7 @@
                   <a:srgbClr val="000000"/>
                 </a:solidFill>
                 <a:latin typeface="Calibri"/>
+                <a:ea typeface="DejaVu Sans"/>
               </a:rPr>
               <a:t>Run the example data</a:t>
             </a:r>
@@ -3118,19 +2954,24 @@
       </p:sp>
       <p:sp>
         <p:nvSpPr>
-          <p:cNvPr id="69" name="CustomShape 29"/>
+          <p:cNvPr id="66" name="CustomShape 29"/>
           <p:cNvSpPr/>
           <p:nvPr/>
         </p:nvSpPr>
         <p:spPr>
           <a:xfrm>
             <a:off x="7839360" y="3638520"/>
-            <a:ext cx="1165680" cy="609840"/>
-          </a:xfrm>
-          <a:prstGeom prst="rect">
-            <a:avLst/>
-          </a:prstGeom>
-          <a:ln w="19080"/>
+            <a:ext cx="1165320" cy="609480"/>
+          </a:xfrm>
+          <a:prstGeom prst="rect">
+            <a:avLst/>
+          </a:prstGeom>
+          <a:ln w="19080">
+            <a:solidFill>
+              <a:srgbClr val="72bf44"/>
+            </a:solidFill>
+            <a:round/>
+          </a:ln>
         </p:spPr>
         <p:style>
           <a:lnRef idx="2">
@@ -3158,6 +2999,7 @@
                   <a:srgbClr val="000000"/>
                 </a:solidFill>
                 <a:latin typeface="Calibri"/>
+                <a:ea typeface="DejaVu Sans"/>
               </a:rPr>
               <a:t>Run the cyanobacterial dataset</a:t>
             </a:r>
@@ -3169,19 +3011,24 @@
       </p:sp>
       <p:sp>
         <p:nvSpPr>
-          <p:cNvPr id="70" name="CustomShape 30"/>
+          <p:cNvPr id="67" name="CustomShape 30"/>
           <p:cNvSpPr/>
           <p:nvPr/>
         </p:nvSpPr>
         <p:spPr>
           <a:xfrm>
             <a:off x="7839360" y="4711320"/>
-            <a:ext cx="1165680" cy="609840"/>
-          </a:xfrm>
-          <a:prstGeom prst="rect">
-            <a:avLst/>
-          </a:prstGeom>
-          <a:ln w="19080"/>
+            <a:ext cx="1165320" cy="609480"/>
+          </a:xfrm>
+          <a:prstGeom prst="rect">
+            <a:avLst/>
+          </a:prstGeom>
+          <a:ln w="19080">
+            <a:solidFill>
+              <a:srgbClr val="0066b3"/>
+            </a:solidFill>
+            <a:round/>
+          </a:ln>
         </p:spPr>
         <p:style>
           <a:lnRef idx="2">
@@ -3209,6 +3056,7 @@
                   <a:srgbClr val="000000"/>
                 </a:solidFill>
                 <a:latin typeface="Calibri"/>
+                <a:ea typeface="DejaVu Sans"/>
               </a:rPr>
               <a:t>Run the other lithotrophic bacterial dataset</a:t>
             </a:r>
@@ -3220,19 +3068,24 @@
       </p:sp>
       <p:sp>
         <p:nvSpPr>
-          <p:cNvPr id="71" name="CustomShape 31"/>
+          <p:cNvPr id="68" name="CustomShape 31"/>
           <p:cNvSpPr/>
           <p:nvPr/>
         </p:nvSpPr>
         <p:spPr>
           <a:xfrm>
             <a:off x="7842240" y="5780880"/>
-            <a:ext cx="1165680" cy="609840"/>
-          </a:xfrm>
-          <a:prstGeom prst="rect">
-            <a:avLst/>
-          </a:prstGeom>
-          <a:ln w="19080"/>
+            <a:ext cx="1165320" cy="609480"/>
+          </a:xfrm>
+          <a:prstGeom prst="rect">
+            <a:avLst/>
+          </a:prstGeom>
+          <a:ln w="19080">
+            <a:solidFill>
+              <a:srgbClr val="0066b3"/>
+            </a:solidFill>
+            <a:round/>
+          </a:ln>
         </p:spPr>
         <p:style>
           <a:lnRef idx="2">
@@ -3260,6 +3113,7 @@
                   <a:srgbClr val="000000"/>
                 </a:solidFill>
                 <a:latin typeface="Calibri"/>
+                <a:ea typeface="DejaVu Sans"/>
               </a:rPr>
               <a:t>Compare results with established methods</a:t>
             </a:r>
@@ -3271,20 +3125,22 @@
       </p:sp>
       <p:sp>
         <p:nvSpPr>
-          <p:cNvPr id="72" name="CustomShape 32"/>
+          <p:cNvPr id="69" name="CustomShape 32"/>
           <p:cNvSpPr/>
           <p:nvPr/>
         </p:nvSpPr>
         <p:spPr>
           <a:xfrm flipH="1" rot="16200000">
-            <a:off x="7425720" y="2454120"/>
-            <a:ext cx="734760" cy="96840"/>
+            <a:off x="7426080" y="2454120"/>
+            <a:ext cx="734400" cy="96480"/>
           </a:xfrm>
           <a:prstGeom prst="bentConnector2">
             <a:avLst/>
           </a:prstGeom>
           <a:noFill/>
-          <a:ln w="38160"/>
+          <a:ln w="38160">
+            <a:round/>
+          </a:ln>
         </p:spPr>
         <p:style>
           <a:lnRef idx="1">
@@ -3301,20 +3157,22 @@
       </p:sp>
       <p:sp>
         <p:nvSpPr>
-          <p:cNvPr id="73" name="CustomShape 33"/>
+          <p:cNvPr id="70" name="CustomShape 33"/>
           <p:cNvSpPr/>
           <p:nvPr/>
         </p:nvSpPr>
         <p:spPr>
           <a:xfrm flipH="1" rot="16200000">
-            <a:off x="6887520" y="2991960"/>
-            <a:ext cx="1807920" cy="93960"/>
+            <a:off x="6887880" y="2991960"/>
+            <a:ext cx="1807560" cy="93600"/>
           </a:xfrm>
           <a:prstGeom prst="bentConnector2">
             <a:avLst/>
           </a:prstGeom>
           <a:noFill/>
-          <a:ln w="38160"/>
+          <a:ln w="38160">
+            <a:round/>
+          </a:ln>
         </p:spPr>
         <p:style>
           <a:lnRef idx="1">
@@ -3331,20 +3189,22 @@
       </p:sp>
       <p:sp>
         <p:nvSpPr>
-          <p:cNvPr id="74" name="CustomShape 34"/>
+          <p:cNvPr id="71" name="CustomShape 34"/>
           <p:cNvSpPr/>
           <p:nvPr/>
         </p:nvSpPr>
         <p:spPr>
           <a:xfrm flipH="1" rot="16200000">
-            <a:off x="6351120" y="3528720"/>
-            <a:ext cx="2881080" cy="93960"/>
+            <a:off x="6351480" y="3528720"/>
+            <a:ext cx="2880720" cy="93600"/>
           </a:xfrm>
           <a:prstGeom prst="bentConnector2">
             <a:avLst/>
           </a:prstGeom>
           <a:noFill/>
-          <a:ln w="38160"/>
+          <a:ln w="38160">
+            <a:round/>
+          </a:ln>
         </p:spPr>
         <p:style>
           <a:lnRef idx="1">
@@ -3361,20 +3221,22 @@
       </p:sp>
       <p:sp>
         <p:nvSpPr>
-          <p:cNvPr id="75" name="CustomShape 35"/>
+          <p:cNvPr id="72" name="CustomShape 35"/>
           <p:cNvSpPr/>
           <p:nvPr/>
         </p:nvSpPr>
         <p:spPr>
           <a:xfrm flipH="1" rot="16200000">
-            <a:off x="5817960" y="4061880"/>
-            <a:ext cx="3950280" cy="96840"/>
+            <a:off x="5818320" y="4061880"/>
+            <a:ext cx="3949920" cy="96480"/>
           </a:xfrm>
           <a:prstGeom prst="bentConnector2">
             <a:avLst/>
           </a:prstGeom>
           <a:noFill/>
-          <a:ln w="38160"/>
+          <a:ln w="38160">
+            <a:round/>
+          </a:ln>
         </p:spPr>
         <p:style>
           <a:lnRef idx="1">
@@ -3391,20 +3253,22 @@
       </p:sp>
       <p:sp>
         <p:nvSpPr>
-          <p:cNvPr id="76" name="CustomShape 36"/>
+          <p:cNvPr id="73" name="CustomShape 36"/>
           <p:cNvSpPr/>
           <p:nvPr/>
         </p:nvSpPr>
         <p:spPr>
           <a:xfrm flipH="1" rot="16200000">
-            <a:off x="10008360" y="2465280"/>
-            <a:ext cx="757080" cy="96840"/>
+            <a:off x="10008720" y="2465280"/>
+            <a:ext cx="756720" cy="96480"/>
           </a:xfrm>
           <a:prstGeom prst="bentConnector2">
             <a:avLst/>
           </a:prstGeom>
           <a:noFill/>
-          <a:ln w="38160"/>
+          <a:ln w="38160">
+            <a:round/>
+          </a:ln>
         </p:spPr>
         <p:style>
           <a:lnRef idx="1">
@@ -3421,20 +3285,22 @@
       </p:sp>
       <p:sp>
         <p:nvSpPr>
-          <p:cNvPr id="77" name="CustomShape 37"/>
+          <p:cNvPr id="74" name="CustomShape 37"/>
           <p:cNvSpPr/>
           <p:nvPr/>
         </p:nvSpPr>
         <p:spPr>
           <a:xfrm flipH="1" rot="16200000">
-            <a:off x="9471960" y="3001680"/>
-            <a:ext cx="1829880" cy="96840"/>
+            <a:off x="9472320" y="3001680"/>
+            <a:ext cx="1829520" cy="96480"/>
           </a:xfrm>
           <a:prstGeom prst="bentConnector2">
             <a:avLst/>
           </a:prstGeom>
           <a:noFill/>
-          <a:ln w="38160"/>
+          <a:ln w="38160">
+            <a:round/>
+          </a:ln>
         </p:spPr>
         <p:style>
           <a:lnRef idx="1">
@@ -3451,19 +3317,21 @@
       </p:sp>
       <p:sp>
         <p:nvSpPr>
-          <p:cNvPr id="78" name="CustomShape 38"/>
+          <p:cNvPr id="75" name="CustomShape 38"/>
           <p:cNvSpPr/>
           <p:nvPr/>
         </p:nvSpPr>
         <p:spPr>
           <a:xfrm>
             <a:off x="10436040" y="4711320"/>
-            <a:ext cx="1165680" cy="609840"/>
-          </a:xfrm>
-          <a:prstGeom prst="rect">
-            <a:avLst/>
-          </a:prstGeom>
-          <a:ln w="19080"/>
+            <a:ext cx="1165320" cy="609480"/>
+          </a:xfrm>
+          <a:prstGeom prst="rect">
+            <a:avLst/>
+          </a:prstGeom>
+          <a:ln w="19080">
+            <a:round/>
+          </a:ln>
         </p:spPr>
         <p:style>
           <a:lnRef idx="2">
@@ -3491,6 +3359,7 @@
                   <a:srgbClr val="000000"/>
                 </a:solidFill>
                 <a:latin typeface="Calibri"/>
+                <a:ea typeface="DejaVu Sans"/>
               </a:rPr>
               <a:t>Prepare the opposition</a:t>
             </a:r>
@@ -3502,20 +3371,22 @@
       </p:sp>
       <p:sp>
         <p:nvSpPr>
-          <p:cNvPr id="79" name="CustomShape 39"/>
+          <p:cNvPr id="76" name="CustomShape 39"/>
           <p:cNvSpPr/>
           <p:nvPr/>
         </p:nvSpPr>
         <p:spPr>
           <a:xfrm flipH="1" rot="16200000">
-            <a:off x="8946360" y="3527280"/>
-            <a:ext cx="2881080" cy="96840"/>
+            <a:off x="8946720" y="3527280"/>
+            <a:ext cx="2880720" cy="96480"/>
           </a:xfrm>
           <a:prstGeom prst="bentConnector2">
             <a:avLst/>
           </a:prstGeom>
           <a:noFill/>
-          <a:ln w="38160"/>
+          <a:ln w="38160">
+            <a:round/>
+          </a:ln>
         </p:spPr>
         <p:style>
           <a:lnRef idx="1">
@@ -3532,19 +3403,21 @@
       </p:sp>
       <p:sp>
         <p:nvSpPr>
-          <p:cNvPr id="80" name="CustomShape 40"/>
+          <p:cNvPr id="77" name="CustomShape 40"/>
           <p:cNvSpPr/>
           <p:nvPr/>
         </p:nvSpPr>
         <p:spPr>
           <a:xfrm>
             <a:off x="1290600" y="259920"/>
-            <a:ext cx="141840" cy="113040"/>
-          </a:xfrm>
-          <a:prstGeom prst="rect">
-            <a:avLst/>
-          </a:prstGeom>
-          <a:ln/>
+            <a:ext cx="141480" cy="112680"/>
+          </a:xfrm>
+          <a:prstGeom prst="rect">
+            <a:avLst/>
+          </a:prstGeom>
+          <a:ln>
+            <a:round/>
+          </a:ln>
         </p:spPr>
         <p:style>
           <a:lnRef idx="2">
@@ -3563,19 +3436,21 @@
       </p:sp>
       <p:sp>
         <p:nvSpPr>
-          <p:cNvPr id="81" name="CustomShape 41"/>
+          <p:cNvPr id="78" name="CustomShape 41"/>
           <p:cNvSpPr/>
           <p:nvPr/>
         </p:nvSpPr>
         <p:spPr>
           <a:xfrm>
             <a:off x="1290600" y="468720"/>
-            <a:ext cx="141840" cy="113040"/>
-          </a:xfrm>
-          <a:prstGeom prst="rect">
-            <a:avLst/>
-          </a:prstGeom>
-          <a:ln/>
+            <a:ext cx="141480" cy="112680"/>
+          </a:xfrm>
+          <a:prstGeom prst="rect">
+            <a:avLst/>
+          </a:prstGeom>
+          <a:ln>
+            <a:round/>
+          </a:ln>
         </p:spPr>
         <p:style>
           <a:lnRef idx="2">
@@ -3594,19 +3469,21 @@
       </p:sp>
       <p:sp>
         <p:nvSpPr>
-          <p:cNvPr id="82" name="CustomShape 42"/>
+          <p:cNvPr id="79" name="CustomShape 42"/>
           <p:cNvSpPr/>
           <p:nvPr/>
         </p:nvSpPr>
         <p:spPr>
           <a:xfrm>
             <a:off x="1290600" y="677160"/>
-            <a:ext cx="141840" cy="113040"/>
-          </a:xfrm>
-          <a:prstGeom prst="rect">
-            <a:avLst/>
-          </a:prstGeom>
-          <a:ln/>
+            <a:ext cx="141480" cy="112680"/>
+          </a:xfrm>
+          <a:prstGeom prst="rect">
+            <a:avLst/>
+          </a:prstGeom>
+          <a:ln>
+            <a:round/>
+          </a:ln>
         </p:spPr>
         <p:style>
           <a:lnRef idx="2">
@@ -3625,14 +3502,14 @@
       </p:sp>
       <p:sp>
         <p:nvSpPr>
-          <p:cNvPr id="83" name="CustomShape 43"/>
+          <p:cNvPr id="80" name="CustomShape 43"/>
           <p:cNvSpPr/>
           <p:nvPr/>
         </p:nvSpPr>
         <p:spPr>
           <a:xfrm>
             <a:off x="1411920" y="185760"/>
-            <a:ext cx="1056960" cy="257760"/>
+            <a:ext cx="1056600" cy="257400"/>
           </a:xfrm>
           <a:prstGeom prst="rect">
             <a:avLst/>
@@ -3662,6 +3539,7 @@
                   <a:srgbClr val="000000"/>
                 </a:solidFill>
                 <a:latin typeface="Calibri"/>
+                <a:ea typeface="DejaVu Sans"/>
               </a:rPr>
               <a:t>Completed</a:t>
             </a:r>
@@ -3673,14 +3551,14 @@
       </p:sp>
       <p:sp>
         <p:nvSpPr>
-          <p:cNvPr id="84" name="CustomShape 44"/>
+          <p:cNvPr id="81" name="CustomShape 44"/>
           <p:cNvSpPr/>
           <p:nvPr/>
         </p:nvSpPr>
         <p:spPr>
           <a:xfrm>
             <a:off x="1411920" y="395280"/>
-            <a:ext cx="606240" cy="257040"/>
+            <a:ext cx="605880" cy="256680"/>
           </a:xfrm>
           <a:prstGeom prst="rect">
             <a:avLst/>
@@ -3710,6 +3588,7 @@
                   <a:srgbClr val="000000"/>
                 </a:solidFill>
                 <a:latin typeface="Calibri"/>
+                <a:ea typeface="DejaVu Sans"/>
               </a:rPr>
               <a:t>WIP</a:t>
             </a:r>
@@ -3721,14 +3600,14 @@
       </p:sp>
       <p:sp>
         <p:nvSpPr>
-          <p:cNvPr id="85" name="CustomShape 45"/>
+          <p:cNvPr id="82" name="CustomShape 45"/>
           <p:cNvSpPr/>
           <p:nvPr/>
         </p:nvSpPr>
         <p:spPr>
           <a:xfrm>
             <a:off x="1411920" y="603720"/>
-            <a:ext cx="1148400" cy="257760"/>
+            <a:ext cx="1148040" cy="257400"/>
           </a:xfrm>
           <a:prstGeom prst="rect">
             <a:avLst/>
@@ -3758,6 +3637,7 @@
                   <a:srgbClr val="000000"/>
                 </a:solidFill>
                 <a:latin typeface="Calibri"/>
+                <a:ea typeface="DejaVu Sans"/>
               </a:rPr>
               <a:t>Not started</a:t>
             </a:r>

</xml_diff>